<commit_message>
updated slideshow - Diana&Kate/uploaded excel
Airlines performance analysis
</commit_message>
<xml_diff>
--- a/docs/slideshow/draft-Final Presentation.pptx
+++ b/docs/slideshow/draft-Final Presentation.pptx
@@ -17,14 +17,14 @@
     <p:sldId id="262" r:id="rId5"/>
     <p:sldId id="268" r:id="rId6"/>
     <p:sldId id="257" r:id="rId7"/>
-    <p:sldId id="269" r:id="rId8"/>
-    <p:sldId id="270" r:id="rId9"/>
-    <p:sldId id="271" r:id="rId10"/>
-    <p:sldId id="272" r:id="rId11"/>
-    <p:sldId id="266" r:id="rId12"/>
-    <p:sldId id="267" r:id="rId13"/>
-    <p:sldId id="265" r:id="rId14"/>
-    <p:sldId id="274" r:id="rId15"/>
+    <p:sldId id="276" r:id="rId8"/>
+    <p:sldId id="271" r:id="rId9"/>
+    <p:sldId id="272" r:id="rId10"/>
+    <p:sldId id="266" r:id="rId11"/>
+    <p:sldId id="277" r:id="rId12"/>
+    <p:sldId id="265" r:id="rId13"/>
+    <p:sldId id="274" r:id="rId14"/>
+    <p:sldId id="267" r:id="rId15"/>
     <p:sldId id="260" r:id="rId16"/>
     <p:sldId id="263" r:id="rId17"/>
     <p:sldId id="275" r:id="rId18"/>
@@ -189,7 +189,7 @@
             </a:lvl1pPr>
           </a:lstStyle>
           <a:p>
-            <a:endParaRPr lang="en-CA"/>
+            <a:endParaRPr lang="en-CA" dirty="0"/>
           </a:p>
         </p:txBody>
       </p:sp>
@@ -228,9 +228,9 @@
           <a:p>
             <a:fld id="{AB74E17C-2864-44D3-B10A-11D5DB0FE025}" type="datetimeFigureOut">
               <a:rPr lang="en-CA" smtClean="0"/>
-              <a:t>2018-06-16</a:t>
+              <a:t>2018-06-17</a:t>
             </a:fld>
-            <a:endParaRPr lang="en-CA"/>
+            <a:endParaRPr lang="en-CA" dirty="0"/>
           </a:p>
         </p:txBody>
       </p:sp>
@@ -267,7 +267,7 @@
             </a:lvl1pPr>
           </a:lstStyle>
           <a:p>
-            <a:endParaRPr lang="en-CA"/>
+            <a:endParaRPr lang="en-CA" dirty="0"/>
           </a:p>
         </p:txBody>
       </p:sp>
@@ -308,7 +308,7 @@
               <a:rPr lang="en-CA" smtClean="0"/>
               <a:t>‹#›</a:t>
             </a:fld>
-            <a:endParaRPr lang="en-CA"/>
+            <a:endParaRPr lang="en-CA" dirty="0"/>
           </a:p>
         </p:txBody>
       </p:sp>
@@ -373,7 +373,7 @@
             </a:lvl1pPr>
           </a:lstStyle>
           <a:p>
-            <a:endParaRPr lang="en-CA"/>
+            <a:endParaRPr lang="en-CA" dirty="0"/>
           </a:p>
         </p:txBody>
       </p:sp>
@@ -406,9 +406,9 @@
           <a:p>
             <a:fld id="{47ECB8A2-9AE6-4065-8149-E49D81AC8424}" type="datetimeFigureOut">
               <a:rPr lang="en-CA" smtClean="0"/>
-              <a:t>2018-06-16</a:t>
+              <a:t>2018-06-17</a:t>
             </a:fld>
-            <a:endParaRPr lang="en-CA"/>
+            <a:endParaRPr lang="en-CA" dirty="0"/>
           </a:p>
         </p:txBody>
       </p:sp>
@@ -441,7 +441,7 @@
           <a:bodyPr vert="horz" lIns="91440" tIns="45720" rIns="91440" bIns="45720" rtlCol="0" anchor="ctr"/>
           <a:lstStyle/>
           <a:p>
-            <a:endParaRPr lang="en-CA"/>
+            <a:endParaRPr lang="en-CA" dirty="0"/>
           </a:p>
         </p:txBody>
       </p:sp>
@@ -532,7 +532,7 @@
             </a:lvl1pPr>
           </a:lstStyle>
           <a:p>
-            <a:endParaRPr lang="en-CA"/>
+            <a:endParaRPr lang="en-CA" dirty="0"/>
           </a:p>
         </p:txBody>
       </p:sp>
@@ -567,7 +567,7 @@
               <a:rPr lang="en-CA" smtClean="0"/>
               <a:t>‹#›</a:t>
             </a:fld>
-            <a:endParaRPr lang="en-CA"/>
+            <a:endParaRPr lang="en-CA" dirty="0"/>
           </a:p>
         </p:txBody>
       </p:sp>
@@ -824,9 +824,9 @@
           <a:p>
             <a:fld id="{4EE2A330-29F9-43E5-8EFD-134344BF2A95}" type="datetime1">
               <a:rPr lang="en-CA" smtClean="0"/>
-              <a:t>2018-06-16</a:t>
+              <a:t>2018-06-17</a:t>
             </a:fld>
-            <a:endParaRPr lang="en-CA"/>
+            <a:endParaRPr lang="en-CA" dirty="0"/>
           </a:p>
         </p:txBody>
       </p:sp>
@@ -852,10 +852,10 @@
           <a:lstStyle/>
           <a:p>
             <a:r>
-              <a:rPr lang="en-US"/>
+              <a:rPr lang="en-US" dirty="0"/>
               <a:t>CSDA1000SUMA18 - Airport Gate Assignment Optimization</a:t>
             </a:r>
-            <a:endParaRPr lang="en-CA"/>
+            <a:endParaRPr lang="en-CA" dirty="0"/>
           </a:p>
         </p:txBody>
       </p:sp>
@@ -884,7 +884,7 @@
               <a:rPr lang="en-CA" smtClean="0"/>
               <a:t>‹#›</a:t>
             </a:fld>
-            <a:endParaRPr lang="en-CA"/>
+            <a:endParaRPr lang="en-CA" dirty="0"/>
           </a:p>
         </p:txBody>
       </p:sp>
@@ -1028,9 +1028,9 @@
           <a:p>
             <a:fld id="{BAAF0BDE-929D-4665-9780-4EB5F4B3CCC7}" type="datetime1">
               <a:rPr lang="en-CA" smtClean="0"/>
-              <a:t>2018-06-16</a:t>
+              <a:t>2018-06-17</a:t>
             </a:fld>
-            <a:endParaRPr lang="en-CA"/>
+            <a:endParaRPr lang="en-CA" dirty="0"/>
           </a:p>
         </p:txBody>
       </p:sp>
@@ -1056,10 +1056,10 @@
           <a:lstStyle/>
           <a:p>
             <a:r>
-              <a:rPr lang="en-US"/>
+              <a:rPr lang="en-US" dirty="0"/>
               <a:t>CSDA1000SUMA18 - Airport Gate Assignment Optimization</a:t>
             </a:r>
-            <a:endParaRPr lang="en-CA"/>
+            <a:endParaRPr lang="en-CA" dirty="0"/>
           </a:p>
         </p:txBody>
       </p:sp>
@@ -1088,7 +1088,7 @@
               <a:rPr lang="en-CA" smtClean="0"/>
               <a:t>‹#›</a:t>
             </a:fld>
-            <a:endParaRPr lang="en-CA"/>
+            <a:endParaRPr lang="en-CA" dirty="0"/>
           </a:p>
         </p:txBody>
       </p:sp>
@@ -1242,9 +1242,9 @@
           <a:p>
             <a:fld id="{A2C755D4-4B90-456F-B69C-A186693D57B8}" type="datetime1">
               <a:rPr lang="en-CA" smtClean="0"/>
-              <a:t>2018-06-16</a:t>
+              <a:t>2018-06-17</a:t>
             </a:fld>
-            <a:endParaRPr lang="en-CA"/>
+            <a:endParaRPr lang="en-CA" dirty="0"/>
           </a:p>
         </p:txBody>
       </p:sp>
@@ -1270,10 +1270,10 @@
           <a:lstStyle/>
           <a:p>
             <a:r>
-              <a:rPr lang="en-US"/>
+              <a:rPr lang="en-US" dirty="0"/>
               <a:t>CSDA1000SUMA18 - Airport Gate Assignment Optimization</a:t>
             </a:r>
-            <a:endParaRPr lang="en-CA"/>
+            <a:endParaRPr lang="en-CA" dirty="0"/>
           </a:p>
         </p:txBody>
       </p:sp>
@@ -1302,7 +1302,7 @@
               <a:rPr lang="en-CA" smtClean="0"/>
               <a:t>‹#›</a:t>
             </a:fld>
-            <a:endParaRPr lang="en-CA"/>
+            <a:endParaRPr lang="en-CA" dirty="0"/>
           </a:p>
         </p:txBody>
       </p:sp>
@@ -1446,9 +1446,9 @@
           <a:p>
             <a:fld id="{1FF6764E-7C1B-4E7A-952E-34FC2C6E79AD}" type="datetime1">
               <a:rPr lang="en-CA" smtClean="0"/>
-              <a:t>2018-06-16</a:t>
+              <a:t>2018-06-17</a:t>
             </a:fld>
-            <a:endParaRPr lang="en-CA"/>
+            <a:endParaRPr lang="en-CA" dirty="0"/>
           </a:p>
         </p:txBody>
       </p:sp>
@@ -1474,10 +1474,10 @@
           <a:lstStyle/>
           <a:p>
             <a:r>
-              <a:rPr lang="en-US"/>
+              <a:rPr lang="en-US" dirty="0"/>
               <a:t>CSDA1000SUMA18 - Airport Gate Assignment Optimization</a:t>
             </a:r>
-            <a:endParaRPr lang="en-CA"/>
+            <a:endParaRPr lang="en-CA" dirty="0"/>
           </a:p>
         </p:txBody>
       </p:sp>
@@ -1506,7 +1506,7 @@
               <a:rPr lang="en-CA" smtClean="0"/>
               <a:t>‹#›</a:t>
             </a:fld>
-            <a:endParaRPr lang="en-CA"/>
+            <a:endParaRPr lang="en-CA" dirty="0"/>
           </a:p>
         </p:txBody>
       </p:sp>
@@ -1726,9 +1726,9 @@
           <a:p>
             <a:fld id="{9D24EC60-0A36-4F96-AC42-2BAAEE1E41EB}" type="datetime1">
               <a:rPr lang="en-CA" smtClean="0"/>
-              <a:t>2018-06-16</a:t>
+              <a:t>2018-06-17</a:t>
             </a:fld>
-            <a:endParaRPr lang="en-CA"/>
+            <a:endParaRPr lang="en-CA" dirty="0"/>
           </a:p>
         </p:txBody>
       </p:sp>
@@ -1754,10 +1754,10 @@
           <a:lstStyle/>
           <a:p>
             <a:r>
-              <a:rPr lang="en-US"/>
+              <a:rPr lang="en-US" dirty="0"/>
               <a:t>CSDA1000SUMA18 - Airport Gate Assignment Optimization</a:t>
             </a:r>
-            <a:endParaRPr lang="en-CA"/>
+            <a:endParaRPr lang="en-CA" dirty="0"/>
           </a:p>
         </p:txBody>
       </p:sp>
@@ -1786,7 +1786,7 @@
               <a:rPr lang="en-CA" smtClean="0"/>
               <a:t>‹#›</a:t>
             </a:fld>
-            <a:endParaRPr lang="en-CA"/>
+            <a:endParaRPr lang="en-CA" dirty="0"/>
           </a:p>
         </p:txBody>
       </p:sp>
@@ -1998,9 +1998,9 @@
           <a:p>
             <a:fld id="{71C7B5FB-E720-4967-B76F-B47E2A2FF606}" type="datetime1">
               <a:rPr lang="en-CA" smtClean="0"/>
-              <a:t>2018-06-16</a:t>
+              <a:t>2018-06-17</a:t>
             </a:fld>
-            <a:endParaRPr lang="en-CA"/>
+            <a:endParaRPr lang="en-CA" dirty="0"/>
           </a:p>
         </p:txBody>
       </p:sp>
@@ -2026,10 +2026,10 @@
           <a:lstStyle/>
           <a:p>
             <a:r>
-              <a:rPr lang="en-US"/>
+              <a:rPr lang="en-US" dirty="0"/>
               <a:t>CSDA1000SUMA18 - Airport Gate Assignment Optimization</a:t>
             </a:r>
-            <a:endParaRPr lang="en-CA"/>
+            <a:endParaRPr lang="en-CA" dirty="0"/>
           </a:p>
         </p:txBody>
       </p:sp>
@@ -2058,7 +2058,7 @@
               <a:rPr lang="en-CA" smtClean="0"/>
               <a:t>‹#›</a:t>
             </a:fld>
-            <a:endParaRPr lang="en-CA"/>
+            <a:endParaRPr lang="en-CA" dirty="0"/>
           </a:p>
         </p:txBody>
       </p:sp>
@@ -2417,9 +2417,9 @@
           <a:p>
             <a:fld id="{D5779243-C9FB-4E23-9AFF-0FC6D6E34D18}" type="datetime1">
               <a:rPr lang="en-CA" smtClean="0"/>
-              <a:t>2018-06-16</a:t>
+              <a:t>2018-06-17</a:t>
             </a:fld>
-            <a:endParaRPr lang="en-CA"/>
+            <a:endParaRPr lang="en-CA" dirty="0"/>
           </a:p>
         </p:txBody>
       </p:sp>
@@ -2445,10 +2445,10 @@
           <a:lstStyle/>
           <a:p>
             <a:r>
-              <a:rPr lang="en-US"/>
+              <a:rPr lang="en-US" dirty="0"/>
               <a:t>CSDA1000SUMA18 - Airport Gate Assignment Optimization</a:t>
             </a:r>
-            <a:endParaRPr lang="en-CA"/>
+            <a:endParaRPr lang="en-CA" dirty="0"/>
           </a:p>
         </p:txBody>
       </p:sp>
@@ -2477,7 +2477,7 @@
               <a:rPr lang="en-CA" smtClean="0"/>
               <a:t>‹#›</a:t>
             </a:fld>
-            <a:endParaRPr lang="en-CA"/>
+            <a:endParaRPr lang="en-CA" dirty="0"/>
           </a:p>
         </p:txBody>
       </p:sp>
@@ -2563,9 +2563,9 @@
           <a:p>
             <a:fld id="{57AEC7D1-DFB7-4FA3-9A4E-9B7E286FA48F}" type="datetime1">
               <a:rPr lang="en-CA" smtClean="0"/>
-              <a:t>2018-06-16</a:t>
+              <a:t>2018-06-17</a:t>
             </a:fld>
-            <a:endParaRPr lang="en-CA"/>
+            <a:endParaRPr lang="en-CA" dirty="0"/>
           </a:p>
         </p:txBody>
       </p:sp>
@@ -2591,10 +2591,10 @@
           <a:lstStyle/>
           <a:p>
             <a:r>
-              <a:rPr lang="en-US"/>
+              <a:rPr lang="en-US" dirty="0"/>
               <a:t>CSDA1000SUMA18 - Airport Gate Assignment Optimization</a:t>
             </a:r>
-            <a:endParaRPr lang="en-CA"/>
+            <a:endParaRPr lang="en-CA" dirty="0"/>
           </a:p>
         </p:txBody>
       </p:sp>
@@ -2623,7 +2623,7 @@
               <a:rPr lang="en-CA" smtClean="0"/>
               <a:t>‹#›</a:t>
             </a:fld>
-            <a:endParaRPr lang="en-CA"/>
+            <a:endParaRPr lang="en-CA" dirty="0"/>
           </a:p>
         </p:txBody>
       </p:sp>
@@ -2680,9 +2680,9 @@
           <a:p>
             <a:fld id="{B54F341B-AA75-43A8-87E4-A79D1428F9B9}" type="datetime1">
               <a:rPr lang="en-CA" smtClean="0"/>
-              <a:t>2018-06-16</a:t>
+              <a:t>2018-06-17</a:t>
             </a:fld>
-            <a:endParaRPr lang="en-CA"/>
+            <a:endParaRPr lang="en-CA" dirty="0"/>
           </a:p>
         </p:txBody>
       </p:sp>
@@ -2708,10 +2708,10 @@
           <a:lstStyle/>
           <a:p>
             <a:r>
-              <a:rPr lang="en-US"/>
+              <a:rPr lang="en-US" dirty="0"/>
               <a:t>CSDA1000SUMA18 - Airport Gate Assignment Optimization</a:t>
             </a:r>
-            <a:endParaRPr lang="en-CA"/>
+            <a:endParaRPr lang="en-CA" dirty="0"/>
           </a:p>
         </p:txBody>
       </p:sp>
@@ -2740,7 +2740,7 @@
               <a:rPr lang="en-CA" smtClean="0"/>
               <a:t>‹#›</a:t>
             </a:fld>
-            <a:endParaRPr lang="en-CA"/>
+            <a:endParaRPr lang="en-CA" dirty="0"/>
           </a:p>
         </p:txBody>
       </p:sp>
@@ -2997,9 +2997,9 @@
           <a:p>
             <a:fld id="{0CCEB221-492B-4468-8BE3-ECC3859FFA90}" type="datetime1">
               <a:rPr lang="en-CA" smtClean="0"/>
-              <a:t>2018-06-16</a:t>
+              <a:t>2018-06-17</a:t>
             </a:fld>
-            <a:endParaRPr lang="en-CA"/>
+            <a:endParaRPr lang="en-CA" dirty="0"/>
           </a:p>
         </p:txBody>
       </p:sp>
@@ -3025,10 +3025,10 @@
           <a:lstStyle/>
           <a:p>
             <a:r>
-              <a:rPr lang="en-US"/>
+              <a:rPr lang="en-US" dirty="0"/>
               <a:t>CSDA1000SUMA18 - Airport Gate Assignment Optimization</a:t>
             </a:r>
-            <a:endParaRPr lang="en-CA"/>
+            <a:endParaRPr lang="en-CA" dirty="0"/>
           </a:p>
         </p:txBody>
       </p:sp>
@@ -3057,7 +3057,7 @@
               <a:rPr lang="en-CA" smtClean="0"/>
               <a:t>‹#›</a:t>
             </a:fld>
-            <a:endParaRPr lang="en-CA"/>
+            <a:endParaRPr lang="en-CA" dirty="0"/>
           </a:p>
         </p:txBody>
       </p:sp>
@@ -3192,7 +3192,7 @@
             </a:lvl9pPr>
           </a:lstStyle>
           <a:p>
-            <a:endParaRPr lang="en-CA"/>
+            <a:endParaRPr lang="en-CA" dirty="0"/>
           </a:p>
         </p:txBody>
       </p:sp>
@@ -3290,9 +3290,9 @@
           <a:p>
             <a:fld id="{B2FB492E-EBB6-4D04-8C6C-9F1DCA87F528}" type="datetime1">
               <a:rPr lang="en-CA" smtClean="0"/>
-              <a:t>2018-06-16</a:t>
+              <a:t>2018-06-17</a:t>
             </a:fld>
-            <a:endParaRPr lang="en-CA"/>
+            <a:endParaRPr lang="en-CA" dirty="0"/>
           </a:p>
         </p:txBody>
       </p:sp>
@@ -3318,10 +3318,10 @@
           <a:lstStyle/>
           <a:p>
             <a:r>
-              <a:rPr lang="en-US"/>
+              <a:rPr lang="en-US" dirty="0"/>
               <a:t>CSDA1000SUMA18 - Airport Gate Assignment Optimization</a:t>
             </a:r>
-            <a:endParaRPr lang="en-CA"/>
+            <a:endParaRPr lang="en-CA" dirty="0"/>
           </a:p>
         </p:txBody>
       </p:sp>
@@ -3350,7 +3350,7 @@
               <a:rPr lang="en-CA" smtClean="0"/>
               <a:t>‹#›</a:t>
             </a:fld>
-            <a:endParaRPr lang="en-CA"/>
+            <a:endParaRPr lang="en-CA" dirty="0"/>
           </a:p>
         </p:txBody>
       </p:sp>
@@ -3537,9 +3537,9 @@
           <a:p>
             <a:fld id="{AF524558-E362-4126-AB20-87DED8565B52}" type="datetime1">
               <a:rPr lang="en-CA" smtClean="0"/>
-              <a:t>2018-06-16</a:t>
+              <a:t>2018-06-17</a:t>
             </a:fld>
-            <a:endParaRPr lang="en-CA"/>
+            <a:endParaRPr lang="en-CA" dirty="0"/>
           </a:p>
         </p:txBody>
       </p:sp>
@@ -3583,10 +3583,10 @@
           </a:lstStyle>
           <a:p>
             <a:r>
-              <a:rPr lang="en-US"/>
+              <a:rPr lang="en-US" dirty="0"/>
               <a:t>CSDA1000SUMA18 - Airport Gate Assignment Optimization</a:t>
             </a:r>
-            <a:endParaRPr lang="en-CA"/>
+            <a:endParaRPr lang="en-CA" dirty="0"/>
           </a:p>
         </p:txBody>
       </p:sp>
@@ -3633,7 +3633,7 @@
               <a:rPr lang="en-CA" smtClean="0"/>
               <a:t>‹#›</a:t>
             </a:fld>
-            <a:endParaRPr lang="en-CA"/>
+            <a:endParaRPr lang="en-CA" dirty="0"/>
           </a:p>
         </p:txBody>
       </p:sp>
@@ -4026,15 +4026,7 @@
             </a:pPr>
             <a:r>
               <a:rPr lang="en-CA" dirty="0"/>
-              <a:t>Viviane </a:t>
-            </a:r>
-            <a:r>
-              <a:rPr lang="en-CA" dirty="0" err="1"/>
-              <a:t>Adohouannon</a:t>
-            </a:r>
-            <a:r>
-              <a:rPr lang="en-CA" dirty="0"/>
-              <a:t> </a:t>
+              <a:t>Viviane Adohouannon </a:t>
             </a:r>
           </a:p>
           <a:p>
@@ -4052,13 +4044,8 @@
             </a:pPr>
             <a:r>
               <a:rPr lang="en-CA" dirty="0"/>
-              <a:t>Juan </a:t>
-            </a:r>
-            <a:r>
-              <a:rPr lang="en-CA" dirty="0" err="1"/>
-              <a:t>Arangote</a:t>
-            </a:r>
-            <a:endParaRPr lang="en-CA" dirty="0"/>
+              <a:t>Juan Arangote</a:t>
+            </a:r>
           </a:p>
           <a:p>
             <a:pPr marL="0" indent="0" algn="ctr">
@@ -4066,13 +4053,8 @@
             </a:pPr>
             <a:r>
               <a:rPr lang="en-CA" dirty="0"/>
-              <a:t>Dian </a:t>
-            </a:r>
-            <a:r>
-              <a:rPr lang="en-CA" dirty="0" err="1"/>
-              <a:t>Azbel</a:t>
-            </a:r>
-            <a:endParaRPr lang="en-CA" dirty="0"/>
+              <a:t>Diana Azbel</a:t>
+            </a:r>
           </a:p>
           <a:p>
             <a:pPr marL="0" indent="0" algn="ctr">
@@ -4167,248 +4149,283 @@
       </p:grpSpPr>
       <p:sp>
         <p:nvSpPr>
-          <p:cNvPr id="4" name="Content Placeholder 2">
-            <a:extLst>
-              <a:ext uri="{FF2B5EF4-FFF2-40B4-BE49-F238E27FC236}">
-                <a16:creationId xmlns:a16="http://schemas.microsoft.com/office/drawing/2014/main" id="{559DD86F-BC43-4B54-BAA9-66EACB8B317D}"/>
-              </a:ext>
-            </a:extLst>
-          </p:cNvPr>
-          <p:cNvSpPr txBox="1">
-            <a:spLocks/>
-          </p:cNvSpPr>
-          <p:nvPr/>
+          <p:cNvPr id="3" name="Content Placeholder 2">
+            <a:extLst>
+              <a:ext uri="{FF2B5EF4-FFF2-40B4-BE49-F238E27FC236}">
+                <a16:creationId xmlns:a16="http://schemas.microsoft.com/office/drawing/2014/main" id="{B358282F-7E58-4D6B-BA02-38DFA4E0A4F6}"/>
+              </a:ext>
+            </a:extLst>
+          </p:cNvPr>
+          <p:cNvSpPr>
+            <a:spLocks noGrp="1"/>
+          </p:cNvSpPr>
+          <p:nvPr>
+            <p:ph idx="1"/>
+          </p:nvPr>
         </p:nvSpPr>
         <p:spPr>
           <a:xfrm>
-            <a:off x="838200" y="357809"/>
-            <a:ext cx="10515600" cy="5819154"/>
+            <a:off x="682807" y="1331238"/>
+            <a:ext cx="2117037" cy="512975"/>
+          </a:xfrm>
+        </p:spPr>
+        <p:txBody>
+          <a:bodyPr>
+            <a:normAutofit fontScale="55000" lnSpcReduction="20000"/>
+          </a:bodyPr>
+          <a:lstStyle/>
+          <a:p>
+            <a:pPr marL="0" indent="0">
+              <a:buNone/>
+            </a:pPr>
+            <a:r>
+              <a:rPr lang="en-US" dirty="0"/>
+              <a:t>The estimated number of passengers per Airline</a:t>
+            </a:r>
+          </a:p>
+          <a:p>
+            <a:pPr marL="0" indent="0">
+              <a:buNone/>
+            </a:pPr>
+            <a:endParaRPr lang="en-US" dirty="0"/>
+          </a:p>
+          <a:p>
+            <a:pPr marL="0" indent="0">
+              <a:buNone/>
+            </a:pPr>
+            <a:endParaRPr lang="en-US" dirty="0"/>
+          </a:p>
+        </p:txBody>
+      </p:sp>
+      <p:sp>
+        <p:nvSpPr>
+          <p:cNvPr id="4" name="Footer Placeholder 3">
+            <a:extLst>
+              <a:ext uri="{FF2B5EF4-FFF2-40B4-BE49-F238E27FC236}">
+                <a16:creationId xmlns:a16="http://schemas.microsoft.com/office/drawing/2014/main" id="{45E1FDCC-7C12-4662-A162-EB7B06BE22C9}"/>
+              </a:ext>
+            </a:extLst>
+          </p:cNvPr>
+          <p:cNvSpPr>
+            <a:spLocks noGrp="1"/>
+          </p:cNvSpPr>
+          <p:nvPr>
+            <p:ph type="ftr" sz="quarter" idx="11"/>
+          </p:nvPr>
+        </p:nvSpPr>
+        <p:spPr/>
+        <p:txBody>
+          <a:bodyPr/>
+          <a:lstStyle/>
+          <a:p>
+            <a:r>
+              <a:rPr lang="en-US" dirty="0"/>
+              <a:t>CSDA1000SUMA18 - Airport Gate Assignment Optimization</a:t>
+            </a:r>
+            <a:endParaRPr lang="en-CA" dirty="0"/>
+          </a:p>
+        </p:txBody>
+      </p:sp>
+      <p:pic>
+        <p:nvPicPr>
+          <p:cNvPr id="5" name="Picture 4">
+            <a:extLst>
+              <a:ext uri="{FF2B5EF4-FFF2-40B4-BE49-F238E27FC236}">
+                <a16:creationId xmlns:a16="http://schemas.microsoft.com/office/drawing/2014/main" id="{1EB0B0E9-114E-4884-8B28-66490B9B4ED3}"/>
+              </a:ext>
+            </a:extLst>
+          </p:cNvPr>
+          <p:cNvPicPr>
+            <a:picLocks noChangeAspect="1"/>
+          </p:cNvPicPr>
+          <p:nvPr/>
+        </p:nvPicPr>
+        <p:blipFill>
+          <a:blip r:embed="rId2">
+            <a:extLst>
+              <a:ext uri="{28A0092B-C50C-407E-A947-70E740481C1C}">
+                <a14:useLocalDpi xmlns:a14="http://schemas.microsoft.com/office/drawing/2010/main" val="0"/>
+              </a:ext>
+            </a:extLst>
+          </a:blip>
+          <a:stretch>
+            <a:fillRect/>
+          </a:stretch>
+        </p:blipFill>
+        <p:spPr>
+          <a:xfrm>
+            <a:off x="682807" y="1709370"/>
+            <a:ext cx="2272428" cy="3131647"/>
           </a:xfrm>
           <a:prstGeom prst="rect">
             <a:avLst/>
           </a:prstGeom>
         </p:spPr>
-        <p:txBody>
-          <a:bodyPr vert="horz" lIns="91440" tIns="45720" rIns="91440" bIns="45720" rtlCol="0">
-            <a:normAutofit/>
-          </a:bodyPr>
-          <a:lstStyle>
-            <a:lvl1pPr marL="228600" indent="-228600" algn="l" defTabSz="914400" rtl="0" eaLnBrk="1" latinLnBrk="0" hangingPunct="1">
-              <a:lnSpc>
-                <a:spcPct val="90000"/>
-              </a:lnSpc>
-              <a:spcBef>
-                <a:spcPts val="1000"/>
-              </a:spcBef>
-              <a:buFont typeface="Arial" panose="020B0604020202020204" pitchFamily="34" charset="0"/>
-              <a:buChar char="•"/>
-              <a:defRPr sz="2800" kern="1200">
-                <a:solidFill>
-                  <a:schemeClr val="tx1"/>
-                </a:solidFill>
-                <a:latin typeface="+mn-lt"/>
-                <a:ea typeface="+mn-ea"/>
-                <a:cs typeface="+mn-cs"/>
-              </a:defRPr>
-            </a:lvl1pPr>
-            <a:lvl2pPr marL="685800" indent="-228600" algn="l" defTabSz="914400" rtl="0" eaLnBrk="1" latinLnBrk="0" hangingPunct="1">
-              <a:lnSpc>
-                <a:spcPct val="90000"/>
-              </a:lnSpc>
-              <a:spcBef>
-                <a:spcPts val="500"/>
-              </a:spcBef>
-              <a:buFont typeface="Arial" panose="020B0604020202020204" pitchFamily="34" charset="0"/>
-              <a:buChar char="•"/>
-              <a:defRPr sz="2400" kern="1200">
-                <a:solidFill>
-                  <a:schemeClr val="tx1"/>
-                </a:solidFill>
-                <a:latin typeface="+mn-lt"/>
-                <a:ea typeface="+mn-ea"/>
-                <a:cs typeface="+mn-cs"/>
-              </a:defRPr>
-            </a:lvl2pPr>
-            <a:lvl3pPr marL="1143000" indent="-228600" algn="l" defTabSz="914400" rtl="0" eaLnBrk="1" latinLnBrk="0" hangingPunct="1">
-              <a:lnSpc>
-                <a:spcPct val="90000"/>
-              </a:lnSpc>
-              <a:spcBef>
-                <a:spcPts val="500"/>
-              </a:spcBef>
-              <a:buFont typeface="Arial" panose="020B0604020202020204" pitchFamily="34" charset="0"/>
-              <a:buChar char="•"/>
-              <a:defRPr sz="2000" kern="1200">
-                <a:solidFill>
-                  <a:schemeClr val="tx1"/>
-                </a:solidFill>
-                <a:latin typeface="+mn-lt"/>
-                <a:ea typeface="+mn-ea"/>
-                <a:cs typeface="+mn-cs"/>
-              </a:defRPr>
-            </a:lvl3pPr>
-            <a:lvl4pPr marL="1600200" indent="-228600" algn="l" defTabSz="914400" rtl="0" eaLnBrk="1" latinLnBrk="0" hangingPunct="1">
-              <a:lnSpc>
-                <a:spcPct val="90000"/>
-              </a:lnSpc>
-              <a:spcBef>
-                <a:spcPts val="500"/>
-              </a:spcBef>
-              <a:buFont typeface="Arial" panose="020B0604020202020204" pitchFamily="34" charset="0"/>
-              <a:buChar char="•"/>
-              <a:defRPr sz="1800" kern="1200">
-                <a:solidFill>
-                  <a:schemeClr val="tx1"/>
-                </a:solidFill>
-                <a:latin typeface="+mn-lt"/>
-                <a:ea typeface="+mn-ea"/>
-                <a:cs typeface="+mn-cs"/>
-              </a:defRPr>
-            </a:lvl4pPr>
-            <a:lvl5pPr marL="2057400" indent="-228600" algn="l" defTabSz="914400" rtl="0" eaLnBrk="1" latinLnBrk="0" hangingPunct="1">
-              <a:lnSpc>
-                <a:spcPct val="90000"/>
-              </a:lnSpc>
-              <a:spcBef>
-                <a:spcPts val="500"/>
-              </a:spcBef>
-              <a:buFont typeface="Arial" panose="020B0604020202020204" pitchFamily="34" charset="0"/>
-              <a:buChar char="•"/>
-              <a:defRPr sz="1800" kern="1200">
-                <a:solidFill>
-                  <a:schemeClr val="tx1"/>
-                </a:solidFill>
-                <a:latin typeface="+mn-lt"/>
-                <a:ea typeface="+mn-ea"/>
-                <a:cs typeface="+mn-cs"/>
-              </a:defRPr>
-            </a:lvl5pPr>
-            <a:lvl6pPr marL="2514600" indent="-228600" algn="l" defTabSz="914400" rtl="0" eaLnBrk="1" latinLnBrk="0" hangingPunct="1">
-              <a:lnSpc>
-                <a:spcPct val="90000"/>
-              </a:lnSpc>
-              <a:spcBef>
-                <a:spcPts val="500"/>
-              </a:spcBef>
-              <a:buFont typeface="Arial" panose="020B0604020202020204" pitchFamily="34" charset="0"/>
-              <a:buChar char="•"/>
-              <a:defRPr sz="1800" kern="1200">
-                <a:solidFill>
-                  <a:schemeClr val="tx1"/>
-                </a:solidFill>
-                <a:latin typeface="+mn-lt"/>
-                <a:ea typeface="+mn-ea"/>
-                <a:cs typeface="+mn-cs"/>
-              </a:defRPr>
-            </a:lvl6pPr>
-            <a:lvl7pPr marL="2971800" indent="-228600" algn="l" defTabSz="914400" rtl="0" eaLnBrk="1" latinLnBrk="0" hangingPunct="1">
-              <a:lnSpc>
-                <a:spcPct val="90000"/>
-              </a:lnSpc>
-              <a:spcBef>
-                <a:spcPts val="500"/>
-              </a:spcBef>
-              <a:buFont typeface="Arial" panose="020B0604020202020204" pitchFamily="34" charset="0"/>
-              <a:buChar char="•"/>
-              <a:defRPr sz="1800" kern="1200">
-                <a:solidFill>
-                  <a:schemeClr val="tx1"/>
-                </a:solidFill>
-                <a:latin typeface="+mn-lt"/>
-                <a:ea typeface="+mn-ea"/>
-                <a:cs typeface="+mn-cs"/>
-              </a:defRPr>
-            </a:lvl7pPr>
-            <a:lvl8pPr marL="3429000" indent="-228600" algn="l" defTabSz="914400" rtl="0" eaLnBrk="1" latinLnBrk="0" hangingPunct="1">
-              <a:lnSpc>
-                <a:spcPct val="90000"/>
-              </a:lnSpc>
-              <a:spcBef>
-                <a:spcPts val="500"/>
-              </a:spcBef>
-              <a:buFont typeface="Arial" panose="020B0604020202020204" pitchFamily="34" charset="0"/>
-              <a:buChar char="•"/>
-              <a:defRPr sz="1800" kern="1200">
-                <a:solidFill>
-                  <a:schemeClr val="tx1"/>
-                </a:solidFill>
-                <a:latin typeface="+mn-lt"/>
-                <a:ea typeface="+mn-ea"/>
-                <a:cs typeface="+mn-cs"/>
-              </a:defRPr>
-            </a:lvl8pPr>
-            <a:lvl9pPr marL="3886200" indent="-228600" algn="l" defTabSz="914400" rtl="0" eaLnBrk="1" latinLnBrk="0" hangingPunct="1">
-              <a:lnSpc>
-                <a:spcPct val="90000"/>
-              </a:lnSpc>
-              <a:spcBef>
-                <a:spcPts val="500"/>
-              </a:spcBef>
-              <a:buFont typeface="Arial" panose="020B0604020202020204" pitchFamily="34" charset="0"/>
-              <a:buChar char="•"/>
-              <a:defRPr sz="1800" kern="1200">
-                <a:solidFill>
-                  <a:schemeClr val="tx1"/>
-                </a:solidFill>
-                <a:latin typeface="+mn-lt"/>
-                <a:ea typeface="+mn-ea"/>
-                <a:cs typeface="+mn-cs"/>
-              </a:defRPr>
-            </a:lvl9pPr>
-          </a:lstStyle>
+      </p:pic>
+      <p:grpSp>
+        <p:nvGrpSpPr>
+          <p:cNvPr id="14" name="Group 13">
+            <a:extLst>
+              <a:ext uri="{FF2B5EF4-FFF2-40B4-BE49-F238E27FC236}">
+                <a16:creationId xmlns:a16="http://schemas.microsoft.com/office/drawing/2014/main" id="{991CE930-91C5-405C-B6E2-9D28DACCC533}"/>
+              </a:ext>
+            </a:extLst>
+          </p:cNvPr>
+          <p:cNvGrpSpPr/>
+          <p:nvPr/>
+        </p:nvGrpSpPr>
+        <p:grpSpPr>
+          <a:xfrm>
+            <a:off x="3432448" y="1195668"/>
+            <a:ext cx="8365153" cy="4813341"/>
+            <a:chOff x="3453046" y="1285148"/>
+            <a:chExt cx="8365153" cy="4813341"/>
+          </a:xfrm>
+        </p:grpSpPr>
+        <p:pic>
+          <p:nvPicPr>
+            <p:cNvPr id="10" name="Picture 9">
+              <a:extLst>
+                <a:ext uri="{FF2B5EF4-FFF2-40B4-BE49-F238E27FC236}">
+                  <a16:creationId xmlns:a16="http://schemas.microsoft.com/office/drawing/2014/main" id="{56E4EF0C-A61F-42D4-99C5-6C66773C7531}"/>
+                </a:ext>
+              </a:extLst>
+            </p:cNvPr>
+            <p:cNvPicPr>
+              <a:picLocks noChangeAspect="1"/>
+            </p:cNvPicPr>
+            <p:nvPr/>
+          </p:nvPicPr>
+          <p:blipFill>
+            <a:blip r:embed="rId3">
+              <a:extLst>
+                <a:ext uri="{28A0092B-C50C-407E-A947-70E740481C1C}">
+                  <a14:useLocalDpi xmlns:a14="http://schemas.microsoft.com/office/drawing/2010/main" val="0"/>
+                </a:ext>
+              </a:extLst>
+            </a:blip>
+            <a:stretch>
+              <a:fillRect/>
+            </a:stretch>
+          </p:blipFill>
+          <p:spPr>
+            <a:xfrm>
+              <a:off x="3542295" y="1625446"/>
+              <a:ext cx="3193722" cy="4306682"/>
+            </a:xfrm>
+            <a:prstGeom prst="rect">
+              <a:avLst/>
+            </a:prstGeom>
+          </p:spPr>
+        </p:pic>
+        <p:pic>
+          <p:nvPicPr>
+            <p:cNvPr id="12" name="Picture 11">
+              <a:extLst>
+                <a:ext uri="{FF2B5EF4-FFF2-40B4-BE49-F238E27FC236}">
+                  <a16:creationId xmlns:a16="http://schemas.microsoft.com/office/drawing/2014/main" id="{E5A5E44D-A161-4213-987D-71242BBC2451}"/>
+                </a:ext>
+              </a:extLst>
+            </p:cNvPr>
+            <p:cNvPicPr>
+              <a:picLocks noChangeAspect="1"/>
+            </p:cNvPicPr>
+            <p:nvPr/>
+          </p:nvPicPr>
+          <p:blipFill rotWithShape="1">
+            <a:blip r:embed="rId4">
+              <a:extLst>
+                <a:ext uri="{28A0092B-C50C-407E-A947-70E740481C1C}">
+                  <a14:useLocalDpi xmlns:a14="http://schemas.microsoft.com/office/drawing/2010/main" val="0"/>
+                </a:ext>
+              </a:extLst>
+            </a:blip>
+            <a:srcRect t="869"/>
+            <a:stretch/>
+          </p:blipFill>
+          <p:spPr>
+            <a:xfrm>
+              <a:off x="6959536" y="1285148"/>
+              <a:ext cx="4858663" cy="4813341"/>
+            </a:xfrm>
+            <a:prstGeom prst="rect">
+              <a:avLst/>
+            </a:prstGeom>
+          </p:spPr>
+        </p:pic>
+        <p:sp>
+          <p:nvSpPr>
+            <p:cNvPr id="7" name="TextBox 6">
+              <a:extLst>
+                <a:ext uri="{FF2B5EF4-FFF2-40B4-BE49-F238E27FC236}">
+                  <a16:creationId xmlns:a16="http://schemas.microsoft.com/office/drawing/2014/main" id="{0033411A-DAE6-4D72-86EB-71F28BCA955E}"/>
+                </a:ext>
+              </a:extLst>
+            </p:cNvPr>
+            <p:cNvSpPr txBox="1"/>
+            <p:nvPr/>
+          </p:nvSpPr>
+          <p:spPr>
+            <a:xfrm>
+              <a:off x="3453046" y="1302281"/>
+              <a:ext cx="5965552" cy="678829"/>
+            </a:xfrm>
+            <a:prstGeom prst="rect">
+              <a:avLst/>
+            </a:prstGeom>
+            <a:noFill/>
+          </p:spPr>
+          <p:txBody>
+            <a:bodyPr wrap="square" rtlCol="0">
+              <a:spAutoFit/>
+            </a:bodyPr>
+            <a:lstStyle/>
+            <a:p>
+              <a:r>
+                <a:rPr lang="en-CA" sz="1500" dirty="0"/>
+                <a:t>Estimate number of passengers affected by Cancellations per Airline</a:t>
+              </a:r>
+            </a:p>
+          </p:txBody>
+        </p:sp>
+      </p:grpSp>
+      <p:sp>
+        <p:nvSpPr>
+          <p:cNvPr id="13" name="Title 1">
+            <a:extLst>
+              <a:ext uri="{FF2B5EF4-FFF2-40B4-BE49-F238E27FC236}">
+                <a16:creationId xmlns:a16="http://schemas.microsoft.com/office/drawing/2014/main" id="{525FCE68-A8FD-4839-A47B-C5EAA851EAE5}"/>
+              </a:ext>
+            </a:extLst>
+          </p:cNvPr>
+          <p:cNvSpPr>
+            <a:spLocks noGrp="1"/>
+          </p:cNvSpPr>
+          <p:nvPr>
+            <p:ph type="title"/>
+          </p:nvPr>
+        </p:nvSpPr>
+        <p:spPr>
+          <a:xfrm>
+            <a:off x="796730" y="311626"/>
+            <a:ext cx="10515600" cy="699283"/>
+          </a:xfrm>
+        </p:spPr>
+        <p:txBody>
+          <a:bodyPr/>
+          <a:lstStyle/>
           <a:p>
             <a:r>
               <a:rPr lang="en-CA" dirty="0"/>
-              <a:t>Delays that are over 15 min</a:t>
-            </a:r>
-          </a:p>
-          <a:p>
-            <a:r>
-              <a:rPr lang="en-CA" dirty="0"/>
-              <a:t>Percentage of delay by Airlines only</a:t>
-            </a:r>
-          </a:p>
-          <a:p>
-            <a:pPr marL="0" indent="0">
-              <a:buNone/>
-            </a:pPr>
-            <a:endParaRPr lang="en-CA" dirty="0"/>
-          </a:p>
-        </p:txBody>
-      </p:sp>
-      <p:sp>
-        <p:nvSpPr>
-          <p:cNvPr id="5" name="Footer Placeholder 4">
-            <a:extLst>
-              <a:ext uri="{FF2B5EF4-FFF2-40B4-BE49-F238E27FC236}">
-                <a16:creationId xmlns:a16="http://schemas.microsoft.com/office/drawing/2014/main" id="{84892EBC-2EB9-4388-816E-41EC6C5CDB5A}"/>
-              </a:ext>
-            </a:extLst>
-          </p:cNvPr>
-          <p:cNvSpPr>
-            <a:spLocks noGrp="1"/>
-          </p:cNvSpPr>
-          <p:nvPr>
-            <p:ph type="ftr" sz="quarter" idx="11"/>
-          </p:nvPr>
-        </p:nvSpPr>
-        <p:spPr/>
-        <p:txBody>
-          <a:bodyPr/>
-          <a:lstStyle/>
-          <a:p>
-            <a:r>
-              <a:rPr lang="en-US"/>
-              <a:t>CSDA1000SUMA18 - Airport Gate Assignment Optimization</a:t>
-            </a:r>
-            <a:endParaRPr lang="en-CA"/>
+              <a:t>Airlines performance analysis</a:t>
+            </a:r>
           </a:p>
         </p:txBody>
       </p:sp>
     </p:spTree>
     <p:extLst>
       <p:ext uri="{BB962C8B-B14F-4D97-AF65-F5344CB8AC3E}">
-        <p14:creationId xmlns:p14="http://schemas.microsoft.com/office/powerpoint/2010/main" val="502788393"/>
+        <p14:creationId xmlns:p14="http://schemas.microsoft.com/office/powerpoint/2010/main" val="1694037018"/>
       </p:ext>
     </p:extLst>
   </p:cSld>
@@ -4437,92 +4454,177 @@
       </p:grpSpPr>
       <p:sp>
         <p:nvSpPr>
-          <p:cNvPr id="3" name="Content Placeholder 2">
-            <a:extLst>
-              <a:ext uri="{FF2B5EF4-FFF2-40B4-BE49-F238E27FC236}">
-                <a16:creationId xmlns:a16="http://schemas.microsoft.com/office/drawing/2014/main" id="{B358282F-7E58-4D6B-BA02-38DFA4E0A4F6}"/>
-              </a:ext>
-            </a:extLst>
-          </p:cNvPr>
-          <p:cNvSpPr>
-            <a:spLocks noGrp="1"/>
-          </p:cNvSpPr>
-          <p:nvPr>
-            <p:ph idx="1"/>
+          <p:cNvPr id="4" name="Footer Placeholder 3">
+            <a:extLst>
+              <a:ext uri="{FF2B5EF4-FFF2-40B4-BE49-F238E27FC236}">
+                <a16:creationId xmlns:a16="http://schemas.microsoft.com/office/drawing/2014/main" id="{71FC4786-A06E-4254-BB1E-101E932019C8}"/>
+              </a:ext>
+            </a:extLst>
+          </p:cNvPr>
+          <p:cNvSpPr>
+            <a:spLocks noGrp="1"/>
+          </p:cNvSpPr>
+          <p:nvPr>
+            <p:ph type="ftr" sz="quarter" idx="11"/>
+          </p:nvPr>
+        </p:nvSpPr>
+        <p:spPr/>
+        <p:txBody>
+          <a:bodyPr/>
+          <a:lstStyle/>
+          <a:p>
+            <a:r>
+              <a:rPr lang="en-US" dirty="0"/>
+              <a:t>CSDA1000SUMA18 - Airport Gate Assignment Optimization</a:t>
+            </a:r>
+            <a:endParaRPr lang="en-CA" dirty="0"/>
+          </a:p>
+        </p:txBody>
+      </p:sp>
+      <p:sp>
+        <p:nvSpPr>
+          <p:cNvPr id="5" name="Title 1">
+            <a:extLst>
+              <a:ext uri="{FF2B5EF4-FFF2-40B4-BE49-F238E27FC236}">
+                <a16:creationId xmlns:a16="http://schemas.microsoft.com/office/drawing/2014/main" id="{41B68D3E-0369-407F-A9AF-D91A589DA709}"/>
+              </a:ext>
+            </a:extLst>
+          </p:cNvPr>
+          <p:cNvSpPr>
+            <a:spLocks noGrp="1"/>
+          </p:cNvSpPr>
+          <p:nvPr>
+            <p:ph type="title"/>
           </p:nvPr>
         </p:nvSpPr>
         <p:spPr>
           <a:xfrm>
-            <a:off x="838199" y="447399"/>
-            <a:ext cx="10995991" cy="3435488"/>
+            <a:off x="796730" y="311626"/>
+            <a:ext cx="10515600" cy="699283"/>
           </a:xfrm>
         </p:spPr>
         <p:txBody>
           <a:bodyPr/>
           <a:lstStyle/>
           <a:p>
-            <a:pPr marL="0" indent="0">
-              <a:buNone/>
-            </a:pPr>
-            <a:r>
-              <a:rPr lang="en-US" dirty="0"/>
-              <a:t>The estimated number of passengers aﬀected by </a:t>
-            </a:r>
-          </a:p>
-          <a:p>
-            <a:pPr marL="0" indent="0">
-              <a:buNone/>
-            </a:pPr>
-            <a:r>
-              <a:rPr lang="en-US" dirty="0"/>
-              <a:t>delays – average</a:t>
-            </a:r>
-          </a:p>
-          <a:p>
-            <a:pPr marL="0" indent="0">
-              <a:buNone/>
-            </a:pPr>
-            <a:r>
-              <a:rPr lang="en-US" dirty="0"/>
-              <a:t>cancellations - average</a:t>
-            </a:r>
-            <a:endParaRPr lang="en-CA" dirty="0"/>
-          </a:p>
-        </p:txBody>
-      </p:sp>
-      <p:sp>
-        <p:nvSpPr>
-          <p:cNvPr id="4" name="Footer Placeholder 3">
-            <a:extLst>
-              <a:ext uri="{FF2B5EF4-FFF2-40B4-BE49-F238E27FC236}">
-                <a16:creationId xmlns:a16="http://schemas.microsoft.com/office/drawing/2014/main" id="{45E1FDCC-7C12-4662-A162-EB7B06BE22C9}"/>
-              </a:ext>
-            </a:extLst>
-          </p:cNvPr>
-          <p:cNvSpPr>
-            <a:spLocks noGrp="1"/>
-          </p:cNvSpPr>
-          <p:nvPr>
-            <p:ph type="ftr" sz="quarter" idx="11"/>
-          </p:nvPr>
-        </p:nvSpPr>
-        <p:spPr/>
-        <p:txBody>
-          <a:bodyPr/>
-          <a:lstStyle/>
-          <a:p>
-            <a:r>
-              <a:rPr lang="en-US"/>
-              <a:t>CSDA1000SUMA18 - Airport Gate Assignment Optimization</a:t>
-            </a:r>
-            <a:endParaRPr lang="en-CA"/>
+            <a:r>
+              <a:rPr lang="en-CA" dirty="0"/>
+              <a:t>Airlines performance analysis</a:t>
+            </a:r>
+          </a:p>
+        </p:txBody>
+      </p:sp>
+      <p:pic>
+        <p:nvPicPr>
+          <p:cNvPr id="9" name="Picture 8">
+            <a:extLst>
+              <a:ext uri="{FF2B5EF4-FFF2-40B4-BE49-F238E27FC236}">
+                <a16:creationId xmlns:a16="http://schemas.microsoft.com/office/drawing/2014/main" id="{EE469259-6B98-4FC3-9596-014C45D13D4B}"/>
+              </a:ext>
+            </a:extLst>
+          </p:cNvPr>
+          <p:cNvPicPr>
+            <a:picLocks noChangeAspect="1"/>
+          </p:cNvPicPr>
+          <p:nvPr/>
+        </p:nvPicPr>
+        <p:blipFill>
+          <a:blip r:embed="rId2">
+            <a:extLst>
+              <a:ext uri="{28A0092B-C50C-407E-A947-70E740481C1C}">
+                <a14:useLocalDpi xmlns:a14="http://schemas.microsoft.com/office/drawing/2010/main" val="0"/>
+              </a:ext>
+            </a:extLst>
+          </a:blip>
+          <a:stretch>
+            <a:fillRect/>
+          </a:stretch>
+        </p:blipFill>
+        <p:spPr>
+          <a:xfrm>
+            <a:off x="1654448" y="1524486"/>
+            <a:ext cx="3274136" cy="4308966"/>
+          </a:xfrm>
+          <a:prstGeom prst="rect">
+            <a:avLst/>
+          </a:prstGeom>
+        </p:spPr>
+      </p:pic>
+      <p:pic>
+        <p:nvPicPr>
+          <p:cNvPr id="12" name="Picture 11">
+            <a:extLst>
+              <a:ext uri="{FF2B5EF4-FFF2-40B4-BE49-F238E27FC236}">
+                <a16:creationId xmlns:a16="http://schemas.microsoft.com/office/drawing/2014/main" id="{396345A7-7737-4A21-B4A0-D80141C86FDE}"/>
+              </a:ext>
+            </a:extLst>
+          </p:cNvPr>
+          <p:cNvPicPr>
+            <a:picLocks noChangeAspect="1"/>
+          </p:cNvPicPr>
+          <p:nvPr/>
+        </p:nvPicPr>
+        <p:blipFill>
+          <a:blip r:embed="rId3">
+            <a:extLst>
+              <a:ext uri="{28A0092B-C50C-407E-A947-70E740481C1C}">
+                <a14:useLocalDpi xmlns:a14="http://schemas.microsoft.com/office/drawing/2010/main" val="0"/>
+              </a:ext>
+            </a:extLst>
+          </a:blip>
+          <a:stretch>
+            <a:fillRect/>
+          </a:stretch>
+        </p:blipFill>
+        <p:spPr>
+          <a:xfrm>
+            <a:off x="5518944" y="1214300"/>
+            <a:ext cx="5268912" cy="5105956"/>
+          </a:xfrm>
+          <a:prstGeom prst="rect">
+            <a:avLst/>
+          </a:prstGeom>
+        </p:spPr>
+      </p:pic>
+      <p:sp>
+        <p:nvSpPr>
+          <p:cNvPr id="10" name="TextBox 9">
+            <a:extLst>
+              <a:ext uri="{FF2B5EF4-FFF2-40B4-BE49-F238E27FC236}">
+                <a16:creationId xmlns:a16="http://schemas.microsoft.com/office/drawing/2014/main" id="{3F3687E5-4672-46D1-B2A4-C23D230F30D3}"/>
+              </a:ext>
+            </a:extLst>
+          </p:cNvPr>
+          <p:cNvSpPr txBox="1"/>
+          <p:nvPr/>
+        </p:nvSpPr>
+        <p:spPr>
+          <a:xfrm>
+            <a:off x="1654448" y="1024548"/>
+            <a:ext cx="5965552" cy="323165"/>
+          </a:xfrm>
+          <a:prstGeom prst="rect">
+            <a:avLst/>
+          </a:prstGeom>
+          <a:noFill/>
+        </p:spPr>
+        <p:txBody>
+          <a:bodyPr wrap="square" rtlCol="0">
+            <a:spAutoFit/>
+          </a:bodyPr>
+          <a:lstStyle/>
+          <a:p>
+            <a:r>
+              <a:rPr lang="en-CA" sz="1500" dirty="0"/>
+              <a:t>Estimate number of passengers affected by delay per Airline</a:t>
+            </a:r>
           </a:p>
         </p:txBody>
       </p:sp>
     </p:spTree>
     <p:extLst>
       <p:ext uri="{BB962C8B-B14F-4D97-AF65-F5344CB8AC3E}">
-        <p14:creationId xmlns:p14="http://schemas.microsoft.com/office/powerpoint/2010/main" val="1694037018"/>
+        <p14:creationId xmlns:p14="http://schemas.microsoft.com/office/powerpoint/2010/main" val="2026692411"/>
       </p:ext>
     </p:extLst>
   </p:cSld>
@@ -4554,7 +4656,7 @@
           <p:cNvPr id="3" name="Content Placeholder 2">
             <a:extLst>
               <a:ext uri="{FF2B5EF4-FFF2-40B4-BE49-F238E27FC236}">
-                <a16:creationId xmlns:a16="http://schemas.microsoft.com/office/drawing/2014/main" id="{DBBFC69D-539F-40BA-BCB7-8D0FAE85B134}"/>
+                <a16:creationId xmlns:a16="http://schemas.microsoft.com/office/drawing/2014/main" id="{19377788-39F9-4E9F-ABCA-6D81F5AD9E8F}"/>
               </a:ext>
             </a:extLst>
           </p:cNvPr>
@@ -4567,17 +4669,54 @@
         </p:nvSpPr>
         <p:spPr>
           <a:xfrm>
-            <a:off x="838200" y="410817"/>
-            <a:ext cx="10515600" cy="5766146"/>
+            <a:off x="796730" y="1007406"/>
+            <a:ext cx="10515600" cy="1010634"/>
           </a:xfrm>
         </p:spPr>
         <p:txBody>
           <a:bodyPr/>
           <a:lstStyle/>
           <a:p>
+            <a:pPr marL="0" indent="0">
+              <a:buNone/>
+            </a:pPr>
+            <a:r>
+              <a:rPr lang="en-CA" dirty="0"/>
+              <a:t>Results: Performance of the Airlines:</a:t>
+            </a:r>
+          </a:p>
+          <a:p>
+            <a:pPr marL="0" indent="0">
+              <a:buNone/>
+            </a:pPr>
+            <a:endParaRPr lang="en-CA" dirty="0"/>
+          </a:p>
+        </p:txBody>
+      </p:sp>
+      <p:sp>
+        <p:nvSpPr>
+          <p:cNvPr id="4" name="Footer Placeholder 3">
+            <a:extLst>
+              <a:ext uri="{FF2B5EF4-FFF2-40B4-BE49-F238E27FC236}">
+                <a16:creationId xmlns:a16="http://schemas.microsoft.com/office/drawing/2014/main" id="{DE023AB9-84FC-40F7-9A88-A68EDD2925EB}"/>
+              </a:ext>
+            </a:extLst>
+          </p:cNvPr>
+          <p:cNvSpPr>
+            <a:spLocks noGrp="1"/>
+          </p:cNvSpPr>
+          <p:nvPr>
+            <p:ph type="ftr" sz="quarter" idx="11"/>
+          </p:nvPr>
+        </p:nvSpPr>
+        <p:spPr/>
+        <p:txBody>
+          <a:bodyPr/>
+          <a:lstStyle/>
+          <a:p>
             <a:r>
               <a:rPr lang="en-US" dirty="0"/>
-              <a:t> the estimated ﬁnancial costs, of delays and cancellation</a:t>
+              <a:t>CSDA1000SUMA18 - Airport Gate Assignment Optimization</a:t>
             </a:r>
             <a:endParaRPr lang="en-CA" dirty="0"/>
           </a:p>
@@ -4585,37 +4724,77 @@
       </p:sp>
       <p:sp>
         <p:nvSpPr>
-          <p:cNvPr id="4" name="Footer Placeholder 3">
-            <a:extLst>
-              <a:ext uri="{FF2B5EF4-FFF2-40B4-BE49-F238E27FC236}">
-                <a16:creationId xmlns:a16="http://schemas.microsoft.com/office/drawing/2014/main" id="{77BCADE1-5DE6-4998-A027-A98F55A3CEBC}"/>
-              </a:ext>
-            </a:extLst>
-          </p:cNvPr>
-          <p:cNvSpPr>
-            <a:spLocks noGrp="1"/>
-          </p:cNvSpPr>
-          <p:nvPr>
-            <p:ph type="ftr" sz="quarter" idx="11"/>
-          </p:nvPr>
-        </p:nvSpPr>
-        <p:spPr/>
-        <p:txBody>
-          <a:bodyPr/>
-          <a:lstStyle/>
-          <a:p>
-            <a:r>
-              <a:rPr lang="en-US"/>
-              <a:t>CSDA1000SUMA18 - Airport Gate Assignment Optimization</a:t>
-            </a:r>
-            <a:endParaRPr lang="en-CA"/>
-          </a:p>
-        </p:txBody>
-      </p:sp>
+          <p:cNvPr id="5" name="Title 1">
+            <a:extLst>
+              <a:ext uri="{FF2B5EF4-FFF2-40B4-BE49-F238E27FC236}">
+                <a16:creationId xmlns:a16="http://schemas.microsoft.com/office/drawing/2014/main" id="{EF801466-BACB-4521-8DDD-3287A69FFBB8}"/>
+              </a:ext>
+            </a:extLst>
+          </p:cNvPr>
+          <p:cNvSpPr>
+            <a:spLocks noGrp="1"/>
+          </p:cNvSpPr>
+          <p:nvPr>
+            <p:ph type="title"/>
+          </p:nvPr>
+        </p:nvSpPr>
+        <p:spPr>
+          <a:xfrm>
+            <a:off x="796730" y="311626"/>
+            <a:ext cx="10515600" cy="699283"/>
+          </a:xfrm>
+        </p:spPr>
+        <p:txBody>
+          <a:bodyPr/>
+          <a:lstStyle/>
+          <a:p>
+            <a:r>
+              <a:rPr lang="en-CA" dirty="0"/>
+              <a:t>Airlines performance analysis</a:t>
+            </a:r>
+          </a:p>
+        </p:txBody>
+      </p:sp>
+      <p:pic>
+        <p:nvPicPr>
+          <p:cNvPr id="6" name="Picture 5">
+            <a:extLst>
+              <a:ext uri="{FF2B5EF4-FFF2-40B4-BE49-F238E27FC236}">
+                <a16:creationId xmlns:a16="http://schemas.microsoft.com/office/drawing/2014/main" id="{F25EF7E2-CFEC-4E03-8254-598448774854}"/>
+              </a:ext>
+            </a:extLst>
+          </p:cNvPr>
+          <p:cNvPicPr>
+            <a:picLocks noChangeAspect="1"/>
+          </p:cNvPicPr>
+          <p:nvPr/>
+        </p:nvPicPr>
+        <p:blipFill>
+          <a:blip r:embed="rId2">
+            <a:extLst>
+              <a:ext uri="{28A0092B-C50C-407E-A947-70E740481C1C}">
+                <a14:useLocalDpi xmlns:a14="http://schemas.microsoft.com/office/drawing/2010/main" val="0"/>
+              </a:ext>
+            </a:extLst>
+          </a:blip>
+          <a:stretch>
+            <a:fillRect/>
+          </a:stretch>
+        </p:blipFill>
+        <p:spPr>
+          <a:xfrm>
+            <a:off x="1422400" y="1512723"/>
+            <a:ext cx="8661400" cy="4552786"/>
+          </a:xfrm>
+          <a:prstGeom prst="rect">
+            <a:avLst/>
+          </a:prstGeom>
+        </p:spPr>
+      </p:pic>
     </p:spTree>
     <p:extLst>
       <p:ext uri="{BB962C8B-B14F-4D97-AF65-F5344CB8AC3E}">
-        <p14:creationId xmlns:p14="http://schemas.microsoft.com/office/powerpoint/2010/main" val="789702087"/>
+        <p14:creationId xmlns:p14="http://schemas.microsoft.com/office/powerpoint/2010/main" val="974220610"/>
       </p:ext>
     </p:extLst>
   </p:cSld>
@@ -4647,7 +4826,7 @@
           <p:cNvPr id="3" name="Content Placeholder 2">
             <a:extLst>
               <a:ext uri="{FF2B5EF4-FFF2-40B4-BE49-F238E27FC236}">
-                <a16:creationId xmlns:a16="http://schemas.microsoft.com/office/drawing/2014/main" id="{19377788-39F9-4E9F-ABCA-6D81F5AD9E8F}"/>
+                <a16:creationId xmlns:a16="http://schemas.microsoft.com/office/drawing/2014/main" id="{91D06B6B-D8C6-491E-8AE1-44549F8945D8}"/>
               </a:ext>
             </a:extLst>
           </p:cNvPr>
@@ -4660,8 +4839,8 @@
         </p:nvSpPr>
         <p:spPr>
           <a:xfrm>
-            <a:off x="838200" y="477078"/>
-            <a:ext cx="10515600" cy="5699885"/>
+            <a:off x="838200" y="1765300"/>
+            <a:ext cx="10515600" cy="4411663"/>
           </a:xfrm>
         </p:spPr>
         <p:txBody>
@@ -4669,58 +4848,88 @@
           <a:lstStyle/>
           <a:p>
             <a:r>
+              <a:rPr lang="en-US" dirty="0"/>
+              <a:t>Historical data and linear progressing, the estimated future delays and cancellations in the next 5, 10, 20 years by airline</a:t>
+            </a:r>
+          </a:p>
+          <a:p>
+            <a:endParaRPr lang="en-US" dirty="0"/>
+          </a:p>
+          <a:p>
+            <a:r>
+              <a:rPr lang="en-US" dirty="0"/>
+              <a:t>For the best airline only</a:t>
+            </a:r>
+            <a:endParaRPr lang="en-CA" dirty="0"/>
+          </a:p>
+        </p:txBody>
+      </p:sp>
+      <p:sp>
+        <p:nvSpPr>
+          <p:cNvPr id="4" name="Footer Placeholder 3">
+            <a:extLst>
+              <a:ext uri="{FF2B5EF4-FFF2-40B4-BE49-F238E27FC236}">
+                <a16:creationId xmlns:a16="http://schemas.microsoft.com/office/drawing/2014/main" id="{E3BEA1FC-60D5-4847-8E34-119296AEFDDF}"/>
+              </a:ext>
+            </a:extLst>
+          </p:cNvPr>
+          <p:cNvSpPr>
+            <a:spLocks noGrp="1"/>
+          </p:cNvSpPr>
+          <p:nvPr>
+            <p:ph type="ftr" sz="quarter" idx="11"/>
+          </p:nvPr>
+        </p:nvSpPr>
+        <p:spPr/>
+        <p:txBody>
+          <a:bodyPr/>
+          <a:lstStyle/>
+          <a:p>
+            <a:r>
+              <a:rPr lang="en-US" dirty="0"/>
+              <a:t>CSDA1000SUMA18 - Airport Gate Assignment Optimization</a:t>
+            </a:r>
+            <a:endParaRPr lang="en-CA" dirty="0"/>
+          </a:p>
+        </p:txBody>
+      </p:sp>
+      <p:sp>
+        <p:nvSpPr>
+          <p:cNvPr id="5" name="Title 1">
+            <a:extLst>
+              <a:ext uri="{FF2B5EF4-FFF2-40B4-BE49-F238E27FC236}">
+                <a16:creationId xmlns:a16="http://schemas.microsoft.com/office/drawing/2014/main" id="{997628FB-DEAE-4765-9691-13FC6568CEDE}"/>
+              </a:ext>
+            </a:extLst>
+          </p:cNvPr>
+          <p:cNvSpPr>
+            <a:spLocks noGrp="1"/>
+          </p:cNvSpPr>
+          <p:nvPr>
+            <p:ph type="title"/>
+          </p:nvPr>
+        </p:nvSpPr>
+        <p:spPr>
+          <a:xfrm>
+            <a:off x="796730" y="311626"/>
+            <a:ext cx="10515600" cy="699283"/>
+          </a:xfrm>
+        </p:spPr>
+        <p:txBody>
+          <a:bodyPr/>
+          <a:lstStyle/>
+          <a:p>
+            <a:r>
               <a:rPr lang="en-CA" dirty="0"/>
-              <a:t>Results:</a:t>
-            </a:r>
-          </a:p>
-          <a:p>
-            <a:r>
-              <a:rPr lang="en-CA" dirty="0"/>
-              <a:t>Performance of the Airlines:</a:t>
-            </a:r>
-          </a:p>
-          <a:p>
-            <a:pPr lvl="1"/>
-            <a:r>
-              <a:rPr lang="en-CA" dirty="0"/>
-              <a:t>Best airline</a:t>
-            </a:r>
-          </a:p>
-        </p:txBody>
-      </p:sp>
-      <p:sp>
-        <p:nvSpPr>
-          <p:cNvPr id="4" name="Footer Placeholder 3">
-            <a:extLst>
-              <a:ext uri="{FF2B5EF4-FFF2-40B4-BE49-F238E27FC236}">
-                <a16:creationId xmlns:a16="http://schemas.microsoft.com/office/drawing/2014/main" id="{DE023AB9-84FC-40F7-9A88-A68EDD2925EB}"/>
-              </a:ext>
-            </a:extLst>
-          </p:cNvPr>
-          <p:cNvSpPr>
-            <a:spLocks noGrp="1"/>
-          </p:cNvSpPr>
-          <p:nvPr>
-            <p:ph type="ftr" sz="quarter" idx="11"/>
-          </p:nvPr>
-        </p:nvSpPr>
-        <p:spPr/>
-        <p:txBody>
-          <a:bodyPr/>
-          <a:lstStyle/>
-          <a:p>
-            <a:r>
-              <a:rPr lang="en-US"/>
-              <a:t>CSDA1000SUMA18 - Airport Gate Assignment Optimization</a:t>
-            </a:r>
-            <a:endParaRPr lang="en-CA"/>
+              <a:t>Airlines performance analysis</a:t>
+            </a:r>
           </a:p>
         </p:txBody>
       </p:sp>
     </p:spTree>
     <p:extLst>
       <p:ext uri="{BB962C8B-B14F-4D97-AF65-F5344CB8AC3E}">
-        <p14:creationId xmlns:p14="http://schemas.microsoft.com/office/powerpoint/2010/main" val="974220610"/>
+        <p14:creationId xmlns:p14="http://schemas.microsoft.com/office/powerpoint/2010/main" val="3649142143"/>
       </p:ext>
     </p:extLst>
   </p:cSld>
@@ -4752,7 +4961,7 @@
           <p:cNvPr id="3" name="Content Placeholder 2">
             <a:extLst>
               <a:ext uri="{FF2B5EF4-FFF2-40B4-BE49-F238E27FC236}">
-                <a16:creationId xmlns:a16="http://schemas.microsoft.com/office/drawing/2014/main" id="{91D06B6B-D8C6-491E-8AE1-44549F8945D8}"/>
+                <a16:creationId xmlns:a16="http://schemas.microsoft.com/office/drawing/2014/main" id="{DBBFC69D-539F-40BA-BCB7-8D0FAE85B134}"/>
               </a:ext>
             </a:extLst>
           </p:cNvPr>
@@ -4765,8 +4974,8 @@
         </p:nvSpPr>
         <p:spPr>
           <a:xfrm>
-            <a:off x="838200" y="424070"/>
-            <a:ext cx="10515600" cy="5752893"/>
+            <a:off x="796730" y="1130299"/>
+            <a:ext cx="10515600" cy="3941763"/>
           </a:xfrm>
         </p:spPr>
         <p:txBody>
@@ -4775,16 +4984,35 @@
           <a:p>
             <a:r>
               <a:rPr lang="en-US" dirty="0"/>
-              <a:t>Historical data and linear progressing, the estimated future delays and cancellations in the next 5, 10, 20 years by airline</a:t>
-            </a:r>
-          </a:p>
-          <a:p>
-            <a:endParaRPr lang="en-US" dirty="0"/>
-          </a:p>
+              <a:t> the estimated ﬁnancial costs, of delays and cancellation –Igor (from the model?)</a:t>
+            </a:r>
+          </a:p>
+        </p:txBody>
+      </p:sp>
+      <p:sp>
+        <p:nvSpPr>
+          <p:cNvPr id="4" name="Footer Placeholder 3">
+            <a:extLst>
+              <a:ext uri="{FF2B5EF4-FFF2-40B4-BE49-F238E27FC236}">
+                <a16:creationId xmlns:a16="http://schemas.microsoft.com/office/drawing/2014/main" id="{77BCADE1-5DE6-4998-A027-A98F55A3CEBC}"/>
+              </a:ext>
+            </a:extLst>
+          </p:cNvPr>
+          <p:cNvSpPr>
+            <a:spLocks noGrp="1"/>
+          </p:cNvSpPr>
+          <p:nvPr>
+            <p:ph type="ftr" sz="quarter" idx="11"/>
+          </p:nvPr>
+        </p:nvSpPr>
+        <p:spPr/>
+        <p:txBody>
+          <a:bodyPr/>
+          <a:lstStyle/>
           <a:p>
             <a:r>
               <a:rPr lang="en-US" dirty="0"/>
-              <a:t>For the best airline only</a:t>
+              <a:t>CSDA1000SUMA18 - Airport Gate Assignment Optimization</a:t>
             </a:r>
             <a:endParaRPr lang="en-CA" dirty="0"/>
           </a:p>
@@ -4792,37 +5020,41 @@
       </p:sp>
       <p:sp>
         <p:nvSpPr>
-          <p:cNvPr id="4" name="Footer Placeholder 3">
-            <a:extLst>
-              <a:ext uri="{FF2B5EF4-FFF2-40B4-BE49-F238E27FC236}">
-                <a16:creationId xmlns:a16="http://schemas.microsoft.com/office/drawing/2014/main" id="{E3BEA1FC-60D5-4847-8E34-119296AEFDDF}"/>
-              </a:ext>
-            </a:extLst>
-          </p:cNvPr>
-          <p:cNvSpPr>
-            <a:spLocks noGrp="1"/>
-          </p:cNvSpPr>
-          <p:nvPr>
-            <p:ph type="ftr" sz="quarter" idx="11"/>
-          </p:nvPr>
-        </p:nvSpPr>
-        <p:spPr/>
-        <p:txBody>
-          <a:bodyPr/>
-          <a:lstStyle/>
-          <a:p>
-            <a:r>
-              <a:rPr lang="en-US"/>
-              <a:t>CSDA1000SUMA18 - Airport Gate Assignment Optimization</a:t>
-            </a:r>
-            <a:endParaRPr lang="en-CA"/>
+          <p:cNvPr id="5" name="Title 1">
+            <a:extLst>
+              <a:ext uri="{FF2B5EF4-FFF2-40B4-BE49-F238E27FC236}">
+                <a16:creationId xmlns:a16="http://schemas.microsoft.com/office/drawing/2014/main" id="{74245819-D1B9-474B-9D28-3C4F4170C371}"/>
+              </a:ext>
+            </a:extLst>
+          </p:cNvPr>
+          <p:cNvSpPr>
+            <a:spLocks noGrp="1"/>
+          </p:cNvSpPr>
+          <p:nvPr>
+            <p:ph type="title"/>
+          </p:nvPr>
+        </p:nvSpPr>
+        <p:spPr>
+          <a:xfrm>
+            <a:off x="796730" y="311626"/>
+            <a:ext cx="10515600" cy="699283"/>
+          </a:xfrm>
+        </p:spPr>
+        <p:txBody>
+          <a:bodyPr/>
+          <a:lstStyle/>
+          <a:p>
+            <a:r>
+              <a:rPr lang="en-CA" dirty="0"/>
+              <a:t>Airlines performance analysis</a:t>
+            </a:r>
           </a:p>
         </p:txBody>
       </p:sp>
     </p:spTree>
     <p:extLst>
       <p:ext uri="{BB962C8B-B14F-4D97-AF65-F5344CB8AC3E}">
-        <p14:creationId xmlns:p14="http://schemas.microsoft.com/office/powerpoint/2010/main" val="3649142143"/>
+        <p14:creationId xmlns:p14="http://schemas.microsoft.com/office/powerpoint/2010/main" val="789702087"/>
       </p:ext>
     </p:extLst>
   </p:cSld>
@@ -4898,7 +5130,7 @@
           <a:bodyPr/>
           <a:lstStyle/>
           <a:p>
-            <a:endParaRPr lang="en-CA"/>
+            <a:endParaRPr lang="en-CA" dirty="0"/>
           </a:p>
         </p:txBody>
       </p:sp>
@@ -4924,10 +5156,10 @@
           <a:lstStyle/>
           <a:p>
             <a:r>
-              <a:rPr lang="en-US"/>
+              <a:rPr lang="en-US" dirty="0"/>
               <a:t>CSDA1000SUMA18 - Airport Gate Assignment Optimization</a:t>
             </a:r>
-            <a:endParaRPr lang="en-CA"/>
+            <a:endParaRPr lang="en-CA" dirty="0"/>
           </a:p>
         </p:txBody>
       </p:sp>
@@ -5036,10 +5268,10 @@
           <a:lstStyle/>
           <a:p>
             <a:r>
-              <a:rPr lang="en-US"/>
+              <a:rPr lang="en-US" dirty="0"/>
               <a:t>CSDA1000SUMA18 - Airport Gate Assignment Optimization</a:t>
             </a:r>
-            <a:endParaRPr lang="en-CA"/>
+            <a:endParaRPr lang="en-CA" dirty="0"/>
           </a:p>
         </p:txBody>
       </p:sp>
@@ -5122,7 +5354,7 @@
           <a:bodyPr/>
           <a:lstStyle/>
           <a:p>
-            <a:endParaRPr lang="en-CA"/>
+            <a:endParaRPr lang="en-CA" dirty="0"/>
           </a:p>
         </p:txBody>
       </p:sp>
@@ -5148,10 +5380,10 @@
           <a:lstStyle/>
           <a:p>
             <a:r>
-              <a:rPr lang="en-US"/>
+              <a:rPr lang="en-US" dirty="0"/>
               <a:t>CSDA1000SUMA18 - Airport Gate Assignment Optimization</a:t>
             </a:r>
-            <a:endParaRPr lang="en-CA"/>
+            <a:endParaRPr lang="en-CA" dirty="0"/>
           </a:p>
         </p:txBody>
       </p:sp>
@@ -5260,10 +5492,10 @@
           <a:lstStyle/>
           <a:p>
             <a:r>
-              <a:rPr lang="en-US"/>
+              <a:rPr lang="en-US" dirty="0"/>
               <a:t>CSDA1000SUMA18 - Airport Gate Assignment Optimization</a:t>
             </a:r>
-            <a:endParaRPr lang="en-CA"/>
+            <a:endParaRPr lang="en-CA" dirty="0"/>
           </a:p>
         </p:txBody>
       </p:sp>
@@ -5372,10 +5604,10 @@
           <a:lstStyle/>
           <a:p>
             <a:r>
-              <a:rPr lang="en-US"/>
+              <a:rPr lang="en-US" dirty="0"/>
               <a:t>CSDA1000SUMA18 - Airport Gate Assignment Optimization</a:t>
             </a:r>
-            <a:endParaRPr lang="en-CA"/>
+            <a:endParaRPr lang="en-CA" dirty="0"/>
           </a:p>
         </p:txBody>
       </p:sp>
@@ -5425,7 +5657,12 @@
             <p:ph type="title"/>
           </p:nvPr>
         </p:nvSpPr>
-        <p:spPr/>
+        <p:spPr>
+          <a:xfrm>
+            <a:off x="838200" y="365125"/>
+            <a:ext cx="10515600" cy="699283"/>
+          </a:xfrm>
+        </p:spPr>
         <p:txBody>
           <a:bodyPr/>
           <a:lstStyle/>
@@ -5455,7 +5692,7 @@
         </p:nvSpPr>
         <p:spPr>
           <a:xfrm>
-            <a:off x="838200" y="1413219"/>
+            <a:off x="838200" y="1064408"/>
             <a:ext cx="10515600" cy="4959445"/>
           </a:xfrm>
         </p:spPr>
@@ -5469,8 +5706,172 @@
               <a:buNone/>
             </a:pPr>
             <a:r>
-              <a:rPr lang="en-US" dirty="0"/>
-              <a:t>Topic: The impacts of airline delays on gate management</a:t>
+              <a:rPr lang="en-US" sz="1400" b="1" dirty="0"/>
+              <a:t>Dataset: 2015 Flight Delays and Cancellations</a:t>
+            </a:r>
+          </a:p>
+          <a:p>
+            <a:pPr marL="0" indent="0">
+              <a:buNone/>
+            </a:pPr>
+            <a:r>
+              <a:rPr lang="en-US" sz="1400" dirty="0"/>
+              <a:t>From: United States of America, Department of Transportation</a:t>
+            </a:r>
+          </a:p>
+          <a:p>
+            <a:pPr marL="0" indent="0">
+              <a:buNone/>
+            </a:pPr>
+            <a:r>
+              <a:rPr lang="en-US" sz="1400" dirty="0"/>
+              <a:t>URL: </a:t>
+            </a:r>
+            <a:r>
+              <a:rPr lang="en-US" sz="1400" dirty="0">
+                <a:hlinkClick r:id="rId2"/>
+              </a:rPr>
+              <a:t>https://www.kaggle.com/usdot/flight-delays/data</a:t>
+            </a:r>
+            <a:endParaRPr lang="en-US" sz="1400" dirty="0"/>
+          </a:p>
+          <a:p>
+            <a:pPr lvl="1">
+              <a:buBlip>
+                <a:blip r:embed="rId3">
+                  <a:extLst>
+                    <a:ext uri="{96DAC541-7B7A-43D3-8B79-37D633B846F1}">
+                      <asvg:svgBlip xmlns:asvg="http://schemas.microsoft.com/office/drawing/2016/SVG/main" r:embed="rId4"/>
+                    </a:ext>
+                  </a:extLst>
+                </a:blip>
+              </a:buBlip>
+            </a:pPr>
+            <a:r>
+              <a:rPr lang="en-US" sz="1100" dirty="0"/>
+              <a:t> airlines.csv</a:t>
+            </a:r>
+          </a:p>
+          <a:p>
+            <a:pPr lvl="1">
+              <a:buBlip>
+                <a:blip r:embed="rId3">
+                  <a:extLst>
+                    <a:ext uri="{96DAC541-7B7A-43D3-8B79-37D633B846F1}">
+                      <asvg:svgBlip xmlns:asvg="http://schemas.microsoft.com/office/drawing/2016/SVG/main" r:embed="rId4"/>
+                    </a:ext>
+                  </a:extLst>
+                </a:blip>
+              </a:buBlip>
+            </a:pPr>
+            <a:r>
+              <a:rPr lang="en-US" sz="1100" dirty="0"/>
+              <a:t> airports.csv</a:t>
+            </a:r>
+          </a:p>
+          <a:p>
+            <a:pPr lvl="1">
+              <a:buBlip>
+                <a:blip r:embed="rId3">
+                  <a:extLst>
+                    <a:ext uri="{96DAC541-7B7A-43D3-8B79-37D633B846F1}">
+                      <asvg:svgBlip xmlns:asvg="http://schemas.microsoft.com/office/drawing/2016/SVG/main" r:embed="rId4"/>
+                    </a:ext>
+                  </a:extLst>
+                </a:blip>
+              </a:buBlip>
+            </a:pPr>
+            <a:r>
+              <a:rPr lang="en-US" sz="1100" dirty="0"/>
+              <a:t> flights.csv</a:t>
+            </a:r>
+          </a:p>
+          <a:p>
+            <a:pPr marL="0" indent="0">
+              <a:buNone/>
+            </a:pPr>
+            <a:r>
+              <a:rPr lang="en-US" sz="1400" b="1" dirty="0"/>
+              <a:t>Dataset: Aircraft Registry</a:t>
+            </a:r>
+          </a:p>
+          <a:p>
+            <a:pPr marL="0" indent="0">
+              <a:buNone/>
+            </a:pPr>
+            <a:r>
+              <a:rPr lang="en-US" sz="1400" dirty="0"/>
+              <a:t>From: United States of America, Federal Aviation Registry</a:t>
+            </a:r>
+          </a:p>
+          <a:p>
+            <a:pPr marL="0" indent="0">
+              <a:buNone/>
+            </a:pPr>
+            <a:r>
+              <a:rPr lang="en-US" sz="1200" dirty="0"/>
+              <a:t>URL: </a:t>
+            </a:r>
+            <a:r>
+              <a:rPr lang="en-US" sz="1200" dirty="0">
+                <a:hlinkClick r:id="rId5"/>
+              </a:rPr>
+              <a:t>https://www.faa.gov/licenses_certificates/aircraft_certification/aircraft_registry/</a:t>
+            </a:r>
+            <a:r>
+              <a:rPr lang="en-US" sz="1200" dirty="0"/>
+              <a:t> </a:t>
+            </a:r>
+          </a:p>
+          <a:p>
+            <a:pPr lvl="1">
+              <a:buBlip>
+                <a:blip r:embed="rId3">
+                  <a:extLst>
+                    <a:ext uri="{96DAC541-7B7A-43D3-8B79-37D633B846F1}">
+                      <asvg:svgBlip xmlns:asvg="http://schemas.microsoft.com/office/drawing/2016/SVG/main" r:embed="rId4"/>
+                    </a:ext>
+                  </a:extLst>
+                </a:blip>
+              </a:buBlip>
+            </a:pPr>
+            <a:r>
+              <a:rPr lang="en-US" sz="1100" dirty="0">
+                <a:solidFill>
+                  <a:prstClr val="black"/>
+                </a:solidFill>
+              </a:rPr>
+              <a:t>MASTER.txt</a:t>
+            </a:r>
+          </a:p>
+          <a:p>
+            <a:pPr lvl="1">
+              <a:buBlip>
+                <a:blip r:embed="rId3">
+                  <a:extLst>
+                    <a:ext uri="{96DAC541-7B7A-43D3-8B79-37D633B846F1}">
+                      <asvg:svgBlip xmlns:asvg="http://schemas.microsoft.com/office/drawing/2016/SVG/main" r:embed="rId4"/>
+                    </a:ext>
+                  </a:extLst>
+                </a:blip>
+              </a:buBlip>
+            </a:pPr>
+            <a:r>
+              <a:rPr lang="en-US" sz="1100" dirty="0">
+                <a:solidFill>
+                  <a:prstClr val="black"/>
+                </a:solidFill>
+              </a:rPr>
+              <a:t>ACFTREF.txt</a:t>
+            </a:r>
+          </a:p>
+          <a:p>
+            <a:pPr marL="0" indent="0">
+              <a:buNone/>
+            </a:pPr>
+            <a:r>
+              <a:rPr lang="en-US" sz="2400" dirty="0"/>
+              <a:t>Research focus: San Francisco International Airport (SFO)</a:t>
             </a:r>
           </a:p>
           <a:p>
@@ -5479,49 +5880,34 @@
             </a:pPr>
             <a:endParaRPr lang="en-US" dirty="0"/>
           </a:p>
-          <a:p>
-            <a:pPr marL="0" indent="0">
-              <a:buNone/>
-            </a:pPr>
+        </p:txBody>
+      </p:sp>
+      <p:sp>
+        <p:nvSpPr>
+          <p:cNvPr id="5" name="Footer Placeholder 4">
+            <a:extLst>
+              <a:ext uri="{FF2B5EF4-FFF2-40B4-BE49-F238E27FC236}">
+                <a16:creationId xmlns:a16="http://schemas.microsoft.com/office/drawing/2014/main" id="{2D62B72A-8387-4568-9FEB-C5382FB86B67}"/>
+              </a:ext>
+            </a:extLst>
+          </p:cNvPr>
+          <p:cNvSpPr>
+            <a:spLocks noGrp="1"/>
+          </p:cNvSpPr>
+          <p:nvPr>
+            <p:ph type="ftr" sz="quarter" idx="11"/>
+          </p:nvPr>
+        </p:nvSpPr>
+        <p:spPr/>
+        <p:txBody>
+          <a:bodyPr/>
+          <a:lstStyle/>
+          <a:p>
             <a:r>
               <a:rPr lang="en-US" dirty="0"/>
-              <a:t>Where did we get the data from</a:t>
-            </a:r>
-          </a:p>
-          <a:p>
-            <a:pPr marL="457200" lvl="1" indent="0">
-              <a:buNone/>
-            </a:pPr>
-            <a:endParaRPr lang="en-US" dirty="0"/>
-          </a:p>
-        </p:txBody>
-      </p:sp>
-      <p:sp>
-        <p:nvSpPr>
-          <p:cNvPr id="5" name="Footer Placeholder 4">
-            <a:extLst>
-              <a:ext uri="{FF2B5EF4-FFF2-40B4-BE49-F238E27FC236}">
-                <a16:creationId xmlns:a16="http://schemas.microsoft.com/office/drawing/2014/main" id="{2D62B72A-8387-4568-9FEB-C5382FB86B67}"/>
-              </a:ext>
-            </a:extLst>
-          </p:cNvPr>
-          <p:cNvSpPr>
-            <a:spLocks noGrp="1"/>
-          </p:cNvSpPr>
-          <p:nvPr>
-            <p:ph type="ftr" sz="quarter" idx="11"/>
-          </p:nvPr>
-        </p:nvSpPr>
-        <p:spPr/>
-        <p:txBody>
-          <a:bodyPr/>
-          <a:lstStyle/>
-          <a:p>
-            <a:r>
-              <a:rPr lang="en-US"/>
               <a:t>CSDA1000SUMA18 - Airport Gate Assignment Optimization</a:t>
             </a:r>
-            <a:endParaRPr lang="en-CA"/>
+            <a:endParaRPr lang="en-CA" dirty="0"/>
           </a:p>
         </p:txBody>
       </p:sp>
@@ -5573,28 +5959,17 @@
         </p:nvSpPr>
         <p:spPr>
           <a:xfrm>
-            <a:off x="838200" y="424070"/>
-            <a:ext cx="10515600" cy="5752893"/>
+            <a:off x="838200" y="1064408"/>
+            <a:ext cx="10515600" cy="5112555"/>
           </a:xfrm>
         </p:spPr>
         <p:txBody>
           <a:bodyPr/>
           <a:lstStyle/>
           <a:p>
-            <a:r>
-              <a:rPr lang="en-US" dirty="0"/>
-              <a:t>Question 1 from WhatsApp </a:t>
-            </a:r>
-            <a:r>
-              <a:rPr lang="en-US" dirty="0" err="1"/>
-              <a:t>covo</a:t>
-            </a:r>
-            <a:endParaRPr lang="en-US" dirty="0"/>
-          </a:p>
-          <a:p>
-            <a:endParaRPr lang="en-US" dirty="0"/>
-          </a:p>
-          <a:p>
+            <a:pPr marL="0" indent="0">
+              <a:buNone/>
+            </a:pPr>
             <a:r>
               <a:rPr lang="en-US" dirty="0"/>
               <a:t>Baseline:</a:t>
@@ -5604,21 +5979,28 @@
             <a:pPr lvl="1"/>
             <a:r>
               <a:rPr lang="en-US" dirty="0"/>
-              <a:t>How many flights we have in total</a:t>
+              <a:t>Total count of Airline Delay: 			33,514	</a:t>
             </a:r>
           </a:p>
           <a:p>
             <a:pPr lvl="1"/>
             <a:r>
               <a:rPr lang="en-US" dirty="0"/>
-              <a:t>How many delays we have in total</a:t>
+              <a:t>Total number of Cancelled flights: 		1,809	</a:t>
             </a:r>
           </a:p>
           <a:p>
             <a:pPr lvl="1"/>
             <a:r>
               <a:rPr lang="en-US" dirty="0"/>
-              <a:t>How many cancellations we have in total</a:t>
+              <a:t>Total number of flights: 				166,535</a:t>
+            </a:r>
+          </a:p>
+          <a:p>
+            <a:pPr lvl="1"/>
+            <a:r>
+              <a:rPr lang="en-US" dirty="0"/>
+              <a:t>Estimated number of Passengers:		366,043,930</a:t>
             </a:r>
           </a:p>
           <a:p>
@@ -5628,53 +6010,132 @@
             <a:endParaRPr lang="en-US" dirty="0"/>
           </a:p>
           <a:p>
-            <a:pPr lvl="1"/>
+            <a:pPr marL="457200" lvl="1" indent="0">
+              <a:buNone/>
+            </a:pPr>
+            <a:endParaRPr lang="en-US" dirty="0"/>
+          </a:p>
+          <a:p>
+            <a:pPr marL="457200" lvl="1" indent="0">
+              <a:buNone/>
+            </a:pPr>
+            <a:endParaRPr lang="en-US" dirty="0"/>
+          </a:p>
+          <a:p>
+            <a:pPr marL="457200" lvl="1" indent="0">
+              <a:buNone/>
+            </a:pPr>
+            <a:endParaRPr lang="en-US" dirty="0"/>
+          </a:p>
+          <a:p>
+            <a:pPr marL="457200" lvl="1" indent="0">
+              <a:buNone/>
+            </a:pPr>
+            <a:endParaRPr lang="en-US" dirty="0"/>
+          </a:p>
+          <a:p>
+            <a:pPr marL="457200" lvl="1" indent="0">
+              <a:buNone/>
+            </a:pPr>
+            <a:endParaRPr lang="en-US" dirty="0"/>
+          </a:p>
+          <a:p>
+            <a:endParaRPr lang="en-CA" dirty="0"/>
+          </a:p>
+        </p:txBody>
+      </p:sp>
+      <p:sp>
+        <p:nvSpPr>
+          <p:cNvPr id="4" name="Footer Placeholder 3">
+            <a:extLst>
+              <a:ext uri="{FF2B5EF4-FFF2-40B4-BE49-F238E27FC236}">
+                <a16:creationId xmlns:a16="http://schemas.microsoft.com/office/drawing/2014/main" id="{43D96854-9F22-4029-929F-87F3DC07282A}"/>
+              </a:ext>
+            </a:extLst>
+          </p:cNvPr>
+          <p:cNvSpPr>
+            <a:spLocks noGrp="1"/>
+          </p:cNvSpPr>
+          <p:nvPr>
+            <p:ph type="ftr" sz="quarter" idx="11"/>
+          </p:nvPr>
+        </p:nvSpPr>
+        <p:spPr/>
+        <p:txBody>
+          <a:bodyPr/>
+          <a:lstStyle/>
+          <a:p>
             <a:r>
               <a:rPr lang="en-US" dirty="0"/>
-              <a:t>What is the percentage of delays by Airline</a:t>
-            </a:r>
-          </a:p>
-          <a:p>
-            <a:pPr lvl="1"/>
-            <a:r>
-              <a:rPr lang="en-US" dirty="0"/>
-              <a:t>What is the percentage of cancellations by Airline</a:t>
-            </a:r>
-          </a:p>
-          <a:p>
+              <a:t>CSDA1000SUMA18 - Airport Gate Assignment Optimization</a:t>
+            </a:r>
             <a:endParaRPr lang="en-CA" dirty="0"/>
           </a:p>
         </p:txBody>
       </p:sp>
       <p:sp>
         <p:nvSpPr>
-          <p:cNvPr id="4" name="Footer Placeholder 3">
-            <a:extLst>
-              <a:ext uri="{FF2B5EF4-FFF2-40B4-BE49-F238E27FC236}">
-                <a16:creationId xmlns:a16="http://schemas.microsoft.com/office/drawing/2014/main" id="{43D96854-9F22-4029-929F-87F3DC07282A}"/>
-              </a:ext>
-            </a:extLst>
-          </p:cNvPr>
-          <p:cNvSpPr>
-            <a:spLocks noGrp="1"/>
-          </p:cNvSpPr>
-          <p:nvPr>
-            <p:ph type="ftr" sz="quarter" idx="11"/>
-          </p:nvPr>
-        </p:nvSpPr>
-        <p:spPr/>
-        <p:txBody>
-          <a:bodyPr/>
-          <a:lstStyle/>
-          <a:p>
-            <a:r>
-              <a:rPr lang="en-US"/>
-              <a:t>CSDA1000SUMA18 - Airport Gate Assignment Optimization</a:t>
-            </a:r>
-            <a:endParaRPr lang="en-CA"/>
-          </a:p>
-        </p:txBody>
-      </p:sp>
+          <p:cNvPr id="5" name="Title 1">
+            <a:extLst>
+              <a:ext uri="{FF2B5EF4-FFF2-40B4-BE49-F238E27FC236}">
+                <a16:creationId xmlns:a16="http://schemas.microsoft.com/office/drawing/2014/main" id="{59DAB566-CB9E-4A66-B5F9-1966270D85BA}"/>
+              </a:ext>
+            </a:extLst>
+          </p:cNvPr>
+          <p:cNvSpPr>
+            <a:spLocks noGrp="1"/>
+          </p:cNvSpPr>
+          <p:nvPr>
+            <p:ph type="title"/>
+          </p:nvPr>
+        </p:nvSpPr>
+        <p:spPr>
+          <a:xfrm>
+            <a:off x="838200" y="365125"/>
+            <a:ext cx="10515600" cy="699283"/>
+          </a:xfrm>
+        </p:spPr>
+        <p:txBody>
+          <a:bodyPr/>
+          <a:lstStyle/>
+          <a:p>
+            <a:r>
+              <a:rPr lang="en-CA" dirty="0"/>
+              <a:t>Airlines performance analysis</a:t>
+            </a:r>
+          </a:p>
+        </p:txBody>
+      </p:sp>
+      <p:pic>
+        <p:nvPicPr>
+          <p:cNvPr id="6" name="Picture 5">
+            <a:extLst>
+              <a:ext uri="{FF2B5EF4-FFF2-40B4-BE49-F238E27FC236}">
+                <a16:creationId xmlns:a16="http://schemas.microsoft.com/office/drawing/2014/main" id="{F110D605-45EB-4DBA-A87D-E0C138A2A00E}"/>
+              </a:ext>
+            </a:extLst>
+          </p:cNvPr>
+          <p:cNvPicPr>
+            <a:picLocks noChangeAspect="1"/>
+          </p:cNvPicPr>
+          <p:nvPr/>
+        </p:nvPicPr>
+        <p:blipFill>
+          <a:blip r:embed="rId2"/>
+          <a:stretch>
+            <a:fillRect/>
+          </a:stretch>
+        </p:blipFill>
+        <p:spPr>
+          <a:xfrm>
+            <a:off x="1358523" y="3324381"/>
+            <a:ext cx="9995277" cy="2111678"/>
+          </a:xfrm>
+          <a:prstGeom prst="rect">
+            <a:avLst/>
+          </a:prstGeom>
+        </p:spPr>
+      </p:pic>
     </p:spTree>
     <p:extLst>
       <p:ext uri="{BB962C8B-B14F-4D97-AF65-F5344CB8AC3E}">
@@ -5705,12 +6166,166 @@
           <a:chExt cx="0" cy="0"/>
         </a:xfrm>
       </p:grpSpPr>
+      <p:sp>
+        <p:nvSpPr>
+          <p:cNvPr id="6" name="Rectangle 5">
+            <a:extLst>
+              <a:ext uri="{FF2B5EF4-FFF2-40B4-BE49-F238E27FC236}">
+                <a16:creationId xmlns:a16="http://schemas.microsoft.com/office/drawing/2014/main" id="{2CBBD928-EA04-4997-AA6D-7802A0B366D8}"/>
+              </a:ext>
+            </a:extLst>
+          </p:cNvPr>
+          <p:cNvSpPr/>
+          <p:nvPr/>
+        </p:nvSpPr>
+        <p:spPr>
+          <a:xfrm>
+            <a:off x="838200" y="941762"/>
+            <a:ext cx="9647943" cy="369332"/>
+          </a:xfrm>
+          <a:prstGeom prst="rect">
+            <a:avLst/>
+          </a:prstGeom>
+        </p:spPr>
+        <p:txBody>
+          <a:bodyPr wrap="square">
+            <a:spAutoFit/>
+          </a:bodyPr>
+          <a:lstStyle/>
+          <a:p>
+            <a:r>
+              <a:rPr lang="en-CA" dirty="0">
+                <a:latin typeface="Arial" panose="020B0604020202020204" pitchFamily="34" charset="0"/>
+                <a:cs typeface="Arial" panose="020B0604020202020204" pitchFamily="34" charset="0"/>
+              </a:rPr>
+              <a:t>Sum of Cancellation Reasons vs. Airline – May through December 2015</a:t>
+            </a:r>
+          </a:p>
+        </p:txBody>
+      </p:sp>
+      <p:sp>
+        <p:nvSpPr>
+          <p:cNvPr id="3" name="Footer Placeholder 2">
+            <a:extLst>
+              <a:ext uri="{FF2B5EF4-FFF2-40B4-BE49-F238E27FC236}">
+                <a16:creationId xmlns:a16="http://schemas.microsoft.com/office/drawing/2014/main" id="{2D5DBBA5-04D1-4D89-B0CE-1FC676385AAB}"/>
+              </a:ext>
+            </a:extLst>
+          </p:cNvPr>
+          <p:cNvSpPr>
+            <a:spLocks noGrp="1"/>
+          </p:cNvSpPr>
+          <p:nvPr>
+            <p:ph type="ftr" sz="quarter" idx="11"/>
+          </p:nvPr>
+        </p:nvSpPr>
+        <p:spPr/>
+        <p:txBody>
+          <a:bodyPr/>
+          <a:lstStyle/>
+          <a:p>
+            <a:r>
+              <a:rPr lang="en-US" dirty="0"/>
+              <a:t>CSDA1000SUMA18 - Airport Gate Assignment Optimization</a:t>
+            </a:r>
+            <a:endParaRPr lang="en-CA" dirty="0"/>
+          </a:p>
+        </p:txBody>
+      </p:sp>
+      <p:sp>
+        <p:nvSpPr>
+          <p:cNvPr id="7" name="Title 1">
+            <a:extLst>
+              <a:ext uri="{FF2B5EF4-FFF2-40B4-BE49-F238E27FC236}">
+                <a16:creationId xmlns:a16="http://schemas.microsoft.com/office/drawing/2014/main" id="{CA0CBC47-EF72-40E0-9F4C-A53234B4A46C}"/>
+              </a:ext>
+            </a:extLst>
+          </p:cNvPr>
+          <p:cNvSpPr>
+            <a:spLocks noGrp="1"/>
+          </p:cNvSpPr>
+          <p:nvPr>
+            <p:ph type="title"/>
+          </p:nvPr>
+        </p:nvSpPr>
+        <p:spPr>
+          <a:xfrm>
+            <a:off x="838200" y="365125"/>
+            <a:ext cx="10515600" cy="699283"/>
+          </a:xfrm>
+        </p:spPr>
+        <p:txBody>
+          <a:bodyPr/>
+          <a:lstStyle/>
+          <a:p>
+            <a:r>
+              <a:rPr lang="en-CA" dirty="0"/>
+              <a:t>Airlines performance analysis</a:t>
+            </a:r>
+          </a:p>
+        </p:txBody>
+      </p:sp>
+      <p:sp>
+        <p:nvSpPr>
+          <p:cNvPr id="8" name="Rectangle 7">
+            <a:extLst>
+              <a:ext uri="{FF2B5EF4-FFF2-40B4-BE49-F238E27FC236}">
+                <a16:creationId xmlns:a16="http://schemas.microsoft.com/office/drawing/2014/main" id="{D8AAC28F-5E03-4E1D-BA79-EE352DC56BDE}"/>
+              </a:ext>
+            </a:extLst>
+          </p:cNvPr>
+          <p:cNvSpPr/>
+          <p:nvPr/>
+        </p:nvSpPr>
+        <p:spPr>
+          <a:xfrm>
+            <a:off x="15049869" y="1337179"/>
+            <a:ext cx="2317200" cy="1277273"/>
+          </a:xfrm>
+          <a:prstGeom prst="rect">
+            <a:avLst/>
+          </a:prstGeom>
+        </p:spPr>
+        <p:txBody>
+          <a:bodyPr wrap="square">
+            <a:spAutoFit/>
+          </a:bodyPr>
+          <a:lstStyle/>
+          <a:p>
+            <a:r>
+              <a:rPr lang="en-CA" sz="1100" dirty="0">
+                <a:latin typeface="Arial" panose="020B0604020202020204" pitchFamily="34" charset="0"/>
+                <a:cs typeface="Arial" panose="020B0604020202020204" pitchFamily="34" charset="0"/>
+              </a:rPr>
+              <a:t>Sum of Cancelled for each Airline broken down by Airport Origin vs. Cancellation Reason. </a:t>
+            </a:r>
+          </a:p>
+          <a:p>
+            <a:r>
+              <a:rPr lang="en-CA" sz="1100" dirty="0">
+                <a:latin typeface="Arial" panose="020B0604020202020204" pitchFamily="34" charset="0"/>
+                <a:cs typeface="Arial" panose="020B0604020202020204" pitchFamily="34" charset="0"/>
+              </a:rPr>
+              <a:t>Colour shows details about the Airline. </a:t>
+            </a:r>
+          </a:p>
+          <a:p>
+            <a:r>
+              <a:rPr lang="en-CA" sz="1100" dirty="0">
+                <a:latin typeface="Arial" panose="020B0604020202020204" pitchFamily="34" charset="0"/>
+                <a:cs typeface="Arial" panose="020B0604020202020204" pitchFamily="34" charset="0"/>
+              </a:rPr>
+              <a:t>This view is filtered on Cancellation Reason.</a:t>
+            </a:r>
+          </a:p>
+        </p:txBody>
+      </p:sp>
       <p:pic>
         <p:nvPicPr>
-          <p:cNvPr id="4" name="Picture 3">
-            <a:extLst>
-              <a:ext uri="{FF2B5EF4-FFF2-40B4-BE49-F238E27FC236}">
-                <a16:creationId xmlns:a16="http://schemas.microsoft.com/office/drawing/2014/main" id="{C31B3DA3-1D62-4807-96D0-150432D2B24D}"/>
+          <p:cNvPr id="5" name="Picture 4">
+            <a:extLst>
+              <a:ext uri="{FF2B5EF4-FFF2-40B4-BE49-F238E27FC236}">
+                <a16:creationId xmlns:a16="http://schemas.microsoft.com/office/drawing/2014/main" id="{2CB5ADDB-C588-414A-9559-B31CA706D899}"/>
               </a:ext>
             </a:extLst>
           </p:cNvPr>
@@ -5727,136 +6342,14 @@
         </p:blipFill>
         <p:spPr>
           <a:xfrm>
-            <a:off x="1178530" y="896509"/>
-            <a:ext cx="10126488" cy="4867954"/>
+            <a:off x="1155700" y="1360901"/>
+            <a:ext cx="9678751" cy="4867954"/>
           </a:xfrm>
           <a:prstGeom prst="rect">
             <a:avLst/>
           </a:prstGeom>
         </p:spPr>
       </p:pic>
-      <p:sp>
-        <p:nvSpPr>
-          <p:cNvPr id="6" name="Rectangle 5">
-            <a:extLst>
-              <a:ext uri="{FF2B5EF4-FFF2-40B4-BE49-F238E27FC236}">
-                <a16:creationId xmlns:a16="http://schemas.microsoft.com/office/drawing/2014/main" id="{2CBBD928-EA04-4997-AA6D-7802A0B366D8}"/>
-              </a:ext>
-            </a:extLst>
-          </p:cNvPr>
-          <p:cNvSpPr/>
-          <p:nvPr/>
-        </p:nvSpPr>
-        <p:spPr>
-          <a:xfrm>
-            <a:off x="1032756" y="5764463"/>
-            <a:ext cx="8848725" cy="600164"/>
-          </a:xfrm>
-          <a:prstGeom prst="rect">
-            <a:avLst/>
-          </a:prstGeom>
-        </p:spPr>
-        <p:txBody>
-          <a:bodyPr wrap="square">
-            <a:spAutoFit/>
-          </a:bodyPr>
-          <a:lstStyle/>
-          <a:p>
-            <a:r>
-              <a:rPr lang="en-CA" sz="1100" dirty="0">
-                <a:latin typeface="Arial" panose="020B0604020202020204" pitchFamily="34" charset="0"/>
-                <a:cs typeface="Arial" panose="020B0604020202020204" pitchFamily="34" charset="0"/>
-              </a:rPr>
-              <a:t>Sum of Cancelled for each Airline broken down by Airport Origin vs. Cancellation Reason. </a:t>
-            </a:r>
-          </a:p>
-          <a:p>
-            <a:r>
-              <a:rPr lang="en-CA" sz="1100" dirty="0">
-                <a:latin typeface="Arial" panose="020B0604020202020204" pitchFamily="34" charset="0"/>
-                <a:cs typeface="Arial" panose="020B0604020202020204" pitchFamily="34" charset="0"/>
-              </a:rPr>
-              <a:t>Colour shows details about the Airline. </a:t>
-            </a:r>
-          </a:p>
-          <a:p>
-            <a:r>
-              <a:rPr lang="en-CA" sz="1100" dirty="0">
-                <a:latin typeface="Arial" panose="020B0604020202020204" pitchFamily="34" charset="0"/>
-                <a:cs typeface="Arial" panose="020B0604020202020204" pitchFamily="34" charset="0"/>
-              </a:rPr>
-              <a:t>This view is filtered on Cancellation Reason.</a:t>
-            </a:r>
-          </a:p>
-        </p:txBody>
-      </p:sp>
-      <p:sp>
-        <p:nvSpPr>
-          <p:cNvPr id="2" name="TextBox 1">
-            <a:extLst>
-              <a:ext uri="{FF2B5EF4-FFF2-40B4-BE49-F238E27FC236}">
-                <a16:creationId xmlns:a16="http://schemas.microsoft.com/office/drawing/2014/main" id="{975EB651-AF67-452C-BDB2-46B28A58F807}"/>
-              </a:ext>
-            </a:extLst>
-          </p:cNvPr>
-          <p:cNvSpPr txBox="1"/>
-          <p:nvPr/>
-        </p:nvSpPr>
-        <p:spPr>
-          <a:xfrm>
-            <a:off x="1178530" y="296345"/>
-            <a:ext cx="9653593" cy="646331"/>
-          </a:xfrm>
-          <a:prstGeom prst="rect">
-            <a:avLst/>
-          </a:prstGeom>
-          <a:noFill/>
-        </p:spPr>
-        <p:txBody>
-          <a:bodyPr wrap="square" rtlCol="0">
-            <a:spAutoFit/>
-          </a:bodyPr>
-          <a:lstStyle/>
-          <a:p>
-            <a:r>
-              <a:rPr lang="en-US" dirty="0"/>
-              <a:t>Total of Airline Cancellation based on reason: </a:t>
-            </a:r>
-          </a:p>
-          <a:p>
-            <a:endParaRPr lang="en-CA" dirty="0"/>
-          </a:p>
-        </p:txBody>
-      </p:sp>
-      <p:sp>
-        <p:nvSpPr>
-          <p:cNvPr id="3" name="Footer Placeholder 2">
-            <a:extLst>
-              <a:ext uri="{FF2B5EF4-FFF2-40B4-BE49-F238E27FC236}">
-                <a16:creationId xmlns:a16="http://schemas.microsoft.com/office/drawing/2014/main" id="{2D5DBBA5-04D1-4D89-B0CE-1FC676385AAB}"/>
-              </a:ext>
-            </a:extLst>
-          </p:cNvPr>
-          <p:cNvSpPr>
-            <a:spLocks noGrp="1"/>
-          </p:cNvSpPr>
-          <p:nvPr>
-            <p:ph type="ftr" sz="quarter" idx="11"/>
-          </p:nvPr>
-        </p:nvSpPr>
-        <p:spPr/>
-        <p:txBody>
-          <a:bodyPr/>
-          <a:lstStyle/>
-          <a:p>
-            <a:r>
-              <a:rPr lang="en-US"/>
-              <a:t>CSDA1000SUMA18 - Airport Gate Assignment Optimization</a:t>
-            </a:r>
-            <a:endParaRPr lang="en-CA"/>
-          </a:p>
-        </p:txBody>
-      </p:sp>
     </p:spTree>
     <p:extLst>
       <p:ext uri="{BB962C8B-B14F-4D97-AF65-F5344CB8AC3E}">
@@ -5889,75 +6382,134 @@
       </p:grpSpPr>
       <p:sp>
         <p:nvSpPr>
-          <p:cNvPr id="2" name="TextBox 1">
-            <a:extLst>
-              <a:ext uri="{FF2B5EF4-FFF2-40B4-BE49-F238E27FC236}">
-                <a16:creationId xmlns:a16="http://schemas.microsoft.com/office/drawing/2014/main" id="{975EB651-AF67-452C-BDB2-46B28A58F807}"/>
-              </a:ext>
-            </a:extLst>
-          </p:cNvPr>
-          <p:cNvSpPr txBox="1"/>
-          <p:nvPr/>
+          <p:cNvPr id="4" name="Footer Placeholder 3">
+            <a:extLst>
+              <a:ext uri="{FF2B5EF4-FFF2-40B4-BE49-F238E27FC236}">
+                <a16:creationId xmlns:a16="http://schemas.microsoft.com/office/drawing/2014/main" id="{69E6F202-AB39-420C-A8C4-ACCA96748CC1}"/>
+              </a:ext>
+            </a:extLst>
+          </p:cNvPr>
+          <p:cNvSpPr>
+            <a:spLocks noGrp="1"/>
+          </p:cNvSpPr>
+          <p:nvPr>
+            <p:ph type="ftr" sz="quarter" idx="11"/>
+          </p:nvPr>
+        </p:nvSpPr>
+        <p:spPr/>
+        <p:txBody>
+          <a:bodyPr/>
+          <a:lstStyle/>
+          <a:p>
+            <a:r>
+              <a:rPr lang="en-US" dirty="0"/>
+              <a:t>CSDA1000SUMA18 - Airport Gate Assignment Optimization</a:t>
+            </a:r>
+            <a:endParaRPr lang="en-CA" dirty="0"/>
+          </a:p>
+        </p:txBody>
+      </p:sp>
+      <p:sp>
+        <p:nvSpPr>
+          <p:cNvPr id="7" name="Title 1">
+            <a:extLst>
+              <a:ext uri="{FF2B5EF4-FFF2-40B4-BE49-F238E27FC236}">
+                <a16:creationId xmlns:a16="http://schemas.microsoft.com/office/drawing/2014/main" id="{28E0A994-E29C-4BCC-A0B2-56BBBCCAFB9E}"/>
+              </a:ext>
+            </a:extLst>
+          </p:cNvPr>
+          <p:cNvSpPr>
+            <a:spLocks noGrp="1"/>
+          </p:cNvSpPr>
+          <p:nvPr>
+            <p:ph type="title"/>
+          </p:nvPr>
         </p:nvSpPr>
         <p:spPr>
           <a:xfrm>
-            <a:off x="1178530" y="296345"/>
-            <a:ext cx="9653593" cy="646331"/>
+            <a:off x="838200" y="365125"/>
+            <a:ext cx="10515600" cy="699283"/>
+          </a:xfrm>
+        </p:spPr>
+        <p:txBody>
+          <a:bodyPr/>
+          <a:lstStyle/>
+          <a:p>
+            <a:r>
+              <a:rPr lang="en-CA" dirty="0"/>
+              <a:t>Airlines performance analysis</a:t>
+            </a:r>
+          </a:p>
+        </p:txBody>
+      </p:sp>
+      <p:sp>
+        <p:nvSpPr>
+          <p:cNvPr id="8" name="Rectangle 7">
+            <a:extLst>
+              <a:ext uri="{FF2B5EF4-FFF2-40B4-BE49-F238E27FC236}">
+                <a16:creationId xmlns:a16="http://schemas.microsoft.com/office/drawing/2014/main" id="{403FF041-7277-41A9-9D62-C449F6010753}"/>
+              </a:ext>
+            </a:extLst>
+          </p:cNvPr>
+          <p:cNvSpPr/>
+          <p:nvPr/>
+        </p:nvSpPr>
+        <p:spPr>
+          <a:xfrm>
+            <a:off x="677156" y="993743"/>
+            <a:ext cx="9647943" cy="369332"/>
           </a:xfrm>
           <a:prstGeom prst="rect">
             <a:avLst/>
           </a:prstGeom>
-          <a:noFill/>
         </p:spPr>
         <p:txBody>
-          <a:bodyPr wrap="square" rtlCol="0">
+          <a:bodyPr wrap="square">
             <a:spAutoFit/>
           </a:bodyPr>
           <a:lstStyle/>
           <a:p>
             <a:r>
-              <a:rPr lang="en-US" dirty="0"/>
-              <a:t>Total of Airline delay based on reason - 2015: </a:t>
-            </a:r>
-          </a:p>
-          <a:p>
-            <a:endParaRPr lang="en-CA" dirty="0"/>
-          </a:p>
-        </p:txBody>
-      </p:sp>
-      <p:sp>
-        <p:nvSpPr>
-          <p:cNvPr id="3" name="Footer Placeholder 2">
-            <a:extLst>
-              <a:ext uri="{FF2B5EF4-FFF2-40B4-BE49-F238E27FC236}">
-                <a16:creationId xmlns:a16="http://schemas.microsoft.com/office/drawing/2014/main" id="{74E6282E-EC3F-4EFE-B2EE-690D5596D2B6}"/>
-              </a:ext>
-            </a:extLst>
-          </p:cNvPr>
-          <p:cNvSpPr>
-            <a:spLocks noGrp="1"/>
-          </p:cNvSpPr>
-          <p:nvPr>
-            <p:ph type="ftr" sz="quarter" idx="11"/>
-          </p:nvPr>
-        </p:nvSpPr>
-        <p:spPr/>
-        <p:txBody>
-          <a:bodyPr/>
-          <a:lstStyle/>
-          <a:p>
-            <a:r>
-              <a:rPr lang="en-US"/>
-              <a:t>CSDA1000SUMA18 - Airport Gate Assignment Optimization</a:t>
-            </a:r>
-            <a:endParaRPr lang="en-CA"/>
-          </a:p>
-        </p:txBody>
-      </p:sp>
+              <a:rPr lang="en-CA" dirty="0"/>
+              <a:t>Sum of all cancellations by Airlines: 1,208 flights (May through December 2015)</a:t>
+            </a:r>
+          </a:p>
+        </p:txBody>
+      </p:sp>
+      <p:pic>
+        <p:nvPicPr>
+          <p:cNvPr id="3" name="Picture 2">
+            <a:extLst>
+              <a:ext uri="{FF2B5EF4-FFF2-40B4-BE49-F238E27FC236}">
+                <a16:creationId xmlns:a16="http://schemas.microsoft.com/office/drawing/2014/main" id="{352B5471-3585-421B-95EC-DF7A25AA11C6}"/>
+              </a:ext>
+            </a:extLst>
+          </p:cNvPr>
+          <p:cNvPicPr>
+            <a:picLocks noChangeAspect="1"/>
+          </p:cNvPicPr>
+          <p:nvPr/>
+        </p:nvPicPr>
+        <p:blipFill>
+          <a:blip r:embed="rId2"/>
+          <a:stretch>
+            <a:fillRect/>
+          </a:stretch>
+        </p:blipFill>
+        <p:spPr>
+          <a:xfrm>
+            <a:off x="1532920" y="1363075"/>
+            <a:ext cx="8668960" cy="4867954"/>
+          </a:xfrm>
+          <a:prstGeom prst="rect">
+            <a:avLst/>
+          </a:prstGeom>
+        </p:spPr>
+      </p:pic>
     </p:spTree>
     <p:extLst>
       <p:ext uri="{BB962C8B-B14F-4D97-AF65-F5344CB8AC3E}">
-        <p14:creationId xmlns:p14="http://schemas.microsoft.com/office/powerpoint/2010/main" val="1849834678"/>
+        <p14:creationId xmlns:p14="http://schemas.microsoft.com/office/powerpoint/2010/main" val="699859894"/>
       </p:ext>
     </p:extLst>
   </p:cSld>
@@ -5986,75 +6538,142 @@
       </p:grpSpPr>
       <p:sp>
         <p:nvSpPr>
-          <p:cNvPr id="2" name="TextBox 1">
-            <a:extLst>
-              <a:ext uri="{FF2B5EF4-FFF2-40B4-BE49-F238E27FC236}">
-                <a16:creationId xmlns:a16="http://schemas.microsoft.com/office/drawing/2014/main" id="{975EB651-AF67-452C-BDB2-46B28A58F807}"/>
-              </a:ext>
-            </a:extLst>
-          </p:cNvPr>
-          <p:cNvSpPr txBox="1"/>
-          <p:nvPr/>
+          <p:cNvPr id="3" name="Content Placeholder 2">
+            <a:extLst>
+              <a:ext uri="{FF2B5EF4-FFF2-40B4-BE49-F238E27FC236}">
+                <a16:creationId xmlns:a16="http://schemas.microsoft.com/office/drawing/2014/main" id="{0FEC3F25-BA6E-4291-9530-EC017F642FF9}"/>
+              </a:ext>
+            </a:extLst>
+          </p:cNvPr>
+          <p:cNvSpPr>
+            <a:spLocks noGrp="1"/>
+          </p:cNvSpPr>
+          <p:nvPr>
+            <p:ph idx="1"/>
+          </p:nvPr>
         </p:nvSpPr>
         <p:spPr>
           <a:xfrm>
-            <a:off x="1178530" y="296345"/>
-            <a:ext cx="9653593" cy="646331"/>
+            <a:off x="838200" y="357809"/>
+            <a:ext cx="10515600" cy="5819154"/>
+          </a:xfrm>
+        </p:spPr>
+        <p:txBody>
+          <a:bodyPr/>
+          <a:lstStyle/>
+          <a:p>
+            <a:r>
+              <a:rPr lang="en-CA" dirty="0"/>
+              <a:t>Percentage of cancellation per Airline</a:t>
+            </a:r>
+          </a:p>
+        </p:txBody>
+      </p:sp>
+      <p:sp>
+        <p:nvSpPr>
+          <p:cNvPr id="4" name="Footer Placeholder 3">
+            <a:extLst>
+              <a:ext uri="{FF2B5EF4-FFF2-40B4-BE49-F238E27FC236}">
+                <a16:creationId xmlns:a16="http://schemas.microsoft.com/office/drawing/2014/main" id="{9D297521-078A-4805-ADEF-F3763BFB88FC}"/>
+              </a:ext>
+            </a:extLst>
+          </p:cNvPr>
+          <p:cNvSpPr>
+            <a:spLocks noGrp="1"/>
+          </p:cNvSpPr>
+          <p:nvPr>
+            <p:ph type="ftr" sz="quarter" idx="11"/>
+          </p:nvPr>
+        </p:nvSpPr>
+        <p:spPr/>
+        <p:txBody>
+          <a:bodyPr/>
+          <a:lstStyle/>
+          <a:p>
+            <a:r>
+              <a:rPr lang="en-US" dirty="0"/>
+              <a:t>CSDA1000SUMA18 - Airport Gate Assignment Optimization</a:t>
+            </a:r>
+            <a:endParaRPr lang="en-CA" dirty="0"/>
+          </a:p>
+        </p:txBody>
+      </p:sp>
+      <p:pic>
+        <p:nvPicPr>
+          <p:cNvPr id="5" name="Picture 4">
+            <a:extLst>
+              <a:ext uri="{FF2B5EF4-FFF2-40B4-BE49-F238E27FC236}">
+                <a16:creationId xmlns:a16="http://schemas.microsoft.com/office/drawing/2014/main" id="{45E42D20-298A-4D36-B9CB-A5ADB8BCE8A6}"/>
+              </a:ext>
+            </a:extLst>
+          </p:cNvPr>
+          <p:cNvPicPr>
+            <a:picLocks noChangeAspect="1"/>
+          </p:cNvPicPr>
+          <p:nvPr/>
+        </p:nvPicPr>
+        <p:blipFill>
+          <a:blip r:embed="rId2">
+            <a:extLst>
+              <a:ext uri="{28A0092B-C50C-407E-A947-70E740481C1C}">
+                <a14:useLocalDpi xmlns:a14="http://schemas.microsoft.com/office/drawing/2010/main" val="0"/>
+              </a:ext>
+            </a:extLst>
+          </a:blip>
+          <a:stretch>
+            <a:fillRect/>
+          </a:stretch>
+        </p:blipFill>
+        <p:spPr>
+          <a:xfrm>
+            <a:off x="5251795" y="1320248"/>
+            <a:ext cx="3981450" cy="3581400"/>
           </a:xfrm>
           <a:prstGeom prst="rect">
             <a:avLst/>
           </a:prstGeom>
-          <a:noFill/>
         </p:spPr>
-        <p:txBody>
-          <a:bodyPr wrap="square" rtlCol="0">
-            <a:spAutoFit/>
-          </a:bodyPr>
-          <a:lstStyle/>
-          <a:p>
-            <a:r>
-              <a:rPr lang="en-US" dirty="0"/>
-              <a:t>Average delay by airline - 2015: </a:t>
-            </a:r>
-          </a:p>
-          <a:p>
-            <a:endParaRPr lang="en-CA" dirty="0"/>
-          </a:p>
-        </p:txBody>
-      </p:sp>
-      <p:sp>
-        <p:nvSpPr>
-          <p:cNvPr id="3" name="Footer Placeholder 2">
-            <a:extLst>
-              <a:ext uri="{FF2B5EF4-FFF2-40B4-BE49-F238E27FC236}">
-                <a16:creationId xmlns:a16="http://schemas.microsoft.com/office/drawing/2014/main" id="{2D9FE5DF-DBF5-40F7-A62F-F2A14A469577}"/>
-              </a:ext>
-            </a:extLst>
-          </p:cNvPr>
-          <p:cNvSpPr>
-            <a:spLocks noGrp="1"/>
-          </p:cNvSpPr>
-          <p:nvPr>
-            <p:ph type="ftr" sz="quarter" idx="11"/>
-          </p:nvPr>
-        </p:nvSpPr>
-        <p:spPr/>
-        <p:txBody>
-          <a:bodyPr/>
-          <a:lstStyle/>
-          <a:p>
-            <a:r>
-              <a:rPr lang="en-US"/>
-              <a:t>CSDA1000SUMA18 - Airport Gate Assignment Optimization</a:t>
-            </a:r>
-            <a:endParaRPr lang="en-CA"/>
-          </a:p>
-        </p:txBody>
-      </p:sp>
+      </p:pic>
+      <p:pic>
+        <p:nvPicPr>
+          <p:cNvPr id="9" name="Picture 8">
+            <a:extLst>
+              <a:ext uri="{FF2B5EF4-FFF2-40B4-BE49-F238E27FC236}">
+                <a16:creationId xmlns:a16="http://schemas.microsoft.com/office/drawing/2014/main" id="{8D395050-ED8E-4FE3-96AC-08E1374696CF}"/>
+              </a:ext>
+            </a:extLst>
+          </p:cNvPr>
+          <p:cNvPicPr>
+            <a:picLocks noChangeAspect="1"/>
+          </p:cNvPicPr>
+          <p:nvPr/>
+        </p:nvPicPr>
+        <p:blipFill>
+          <a:blip r:embed="rId3">
+            <a:extLst>
+              <a:ext uri="{28A0092B-C50C-407E-A947-70E740481C1C}">
+                <a14:useLocalDpi xmlns:a14="http://schemas.microsoft.com/office/drawing/2010/main" val="0"/>
+              </a:ext>
+            </a:extLst>
+          </a:blip>
+          <a:stretch>
+            <a:fillRect/>
+          </a:stretch>
+        </p:blipFill>
+        <p:spPr>
+          <a:xfrm>
+            <a:off x="1292708" y="1320248"/>
+            <a:ext cx="3504579" cy="3844488"/>
+          </a:xfrm>
+          <a:prstGeom prst="rect">
+            <a:avLst/>
+          </a:prstGeom>
+        </p:spPr>
+      </p:pic>
     </p:spTree>
     <p:extLst>
       <p:ext uri="{BB962C8B-B14F-4D97-AF65-F5344CB8AC3E}">
-        <p14:creationId xmlns:p14="http://schemas.microsoft.com/office/powerpoint/2010/main" val="819795138"/>
+        <p14:creationId xmlns:p14="http://schemas.microsoft.com/office/powerpoint/2010/main" val="2404455960"/>
       </p:ext>
     </p:extLst>
   </p:cSld>
@@ -6083,24 +6702,146 @@
       </p:grpSpPr>
       <p:sp>
         <p:nvSpPr>
-          <p:cNvPr id="3" name="Content Placeholder 2">
-            <a:extLst>
-              <a:ext uri="{FF2B5EF4-FFF2-40B4-BE49-F238E27FC236}">
-                <a16:creationId xmlns:a16="http://schemas.microsoft.com/office/drawing/2014/main" id="{0FEC3F25-BA6E-4291-9530-EC017F642FF9}"/>
-              </a:ext>
-            </a:extLst>
-          </p:cNvPr>
-          <p:cNvSpPr>
-            <a:spLocks noGrp="1"/>
-          </p:cNvSpPr>
-          <p:nvPr>
-            <p:ph idx="1"/>
+          <p:cNvPr id="5" name="Footer Placeholder 4">
+            <a:extLst>
+              <a:ext uri="{FF2B5EF4-FFF2-40B4-BE49-F238E27FC236}">
+                <a16:creationId xmlns:a16="http://schemas.microsoft.com/office/drawing/2014/main" id="{84892EBC-2EB9-4388-816E-41EC6C5CDB5A}"/>
+              </a:ext>
+            </a:extLst>
+          </p:cNvPr>
+          <p:cNvSpPr>
+            <a:spLocks noGrp="1"/>
+          </p:cNvSpPr>
+          <p:nvPr>
+            <p:ph type="ftr" sz="quarter" idx="11"/>
+          </p:nvPr>
+        </p:nvSpPr>
+        <p:spPr/>
+        <p:txBody>
+          <a:bodyPr/>
+          <a:lstStyle/>
+          <a:p>
+            <a:r>
+              <a:rPr lang="en-US" dirty="0"/>
+              <a:t>CSDA1000SUMA18 - Airport Gate Assignment Optimization</a:t>
+            </a:r>
+            <a:endParaRPr lang="en-CA" dirty="0"/>
+          </a:p>
+        </p:txBody>
+      </p:sp>
+      <p:grpSp>
+        <p:nvGrpSpPr>
+          <p:cNvPr id="9" name="Group 8">
+            <a:extLst>
+              <a:ext uri="{FF2B5EF4-FFF2-40B4-BE49-F238E27FC236}">
+                <a16:creationId xmlns:a16="http://schemas.microsoft.com/office/drawing/2014/main" id="{67DAED50-13FB-44BA-8771-647B41B8F23D}"/>
+              </a:ext>
+            </a:extLst>
+          </p:cNvPr>
+          <p:cNvGrpSpPr/>
+          <p:nvPr/>
+        </p:nvGrpSpPr>
+        <p:grpSpPr>
+          <a:xfrm>
+            <a:off x="1974850" y="1485900"/>
+            <a:ext cx="8147050" cy="4478460"/>
+            <a:chOff x="1974850" y="1133475"/>
+            <a:chExt cx="8616952" cy="4830885"/>
+          </a:xfrm>
+        </p:grpSpPr>
+        <p:pic>
+          <p:nvPicPr>
+            <p:cNvPr id="3" name="Picture 2">
+              <a:extLst>
+                <a:ext uri="{FF2B5EF4-FFF2-40B4-BE49-F238E27FC236}">
+                  <a16:creationId xmlns:a16="http://schemas.microsoft.com/office/drawing/2014/main" id="{D4BDE4D1-395E-4AAB-892D-FC64ADE8B8EC}"/>
+                </a:ext>
+              </a:extLst>
+            </p:cNvPr>
+            <p:cNvPicPr>
+              <a:picLocks noChangeAspect="1"/>
+            </p:cNvPicPr>
+            <p:nvPr/>
+          </p:nvPicPr>
+          <p:blipFill>
+            <a:blip r:embed="rId2">
+              <a:extLst>
+                <a:ext uri="{28A0092B-C50C-407E-A947-70E740481C1C}">
+                  <a14:useLocalDpi xmlns:a14="http://schemas.microsoft.com/office/drawing/2010/main" val="0"/>
+                </a:ext>
+              </a:extLst>
+            </a:blip>
+            <a:stretch>
+              <a:fillRect/>
+            </a:stretch>
+          </p:blipFill>
+          <p:spPr>
+            <a:xfrm>
+              <a:off x="1974850" y="1133475"/>
+              <a:ext cx="2927350" cy="4556724"/>
+            </a:xfrm>
+            <a:prstGeom prst="rect">
+              <a:avLst/>
+            </a:prstGeom>
+          </p:spPr>
+        </p:pic>
+        <p:pic>
+          <p:nvPicPr>
+            <p:cNvPr id="7" name="Picture 6">
+              <a:extLst>
+                <a:ext uri="{FF2B5EF4-FFF2-40B4-BE49-F238E27FC236}">
+                  <a16:creationId xmlns:a16="http://schemas.microsoft.com/office/drawing/2014/main" id="{6E09470D-02DB-42AC-81A9-220332C86032}"/>
+                </a:ext>
+              </a:extLst>
+            </p:cNvPr>
+            <p:cNvPicPr>
+              <a:picLocks noChangeAspect="1"/>
+            </p:cNvPicPr>
+            <p:nvPr/>
+          </p:nvPicPr>
+          <p:blipFill>
+            <a:blip r:embed="rId3">
+              <a:extLst>
+                <a:ext uri="{28A0092B-C50C-407E-A947-70E740481C1C}">
+                  <a14:useLocalDpi xmlns:a14="http://schemas.microsoft.com/office/drawing/2010/main" val="0"/>
+                </a:ext>
+              </a:extLst>
+            </a:blip>
+            <a:stretch>
+              <a:fillRect/>
+            </a:stretch>
+          </p:blipFill>
+          <p:spPr>
+            <a:xfrm>
+              <a:off x="5130802" y="1133475"/>
+              <a:ext cx="5461000" cy="4830885"/>
+            </a:xfrm>
+            <a:prstGeom prst="rect">
+              <a:avLst/>
+            </a:prstGeom>
+          </p:spPr>
+        </p:pic>
+      </p:grpSp>
+      <p:sp>
+        <p:nvSpPr>
+          <p:cNvPr id="8" name="Title 1">
+            <a:extLst>
+              <a:ext uri="{FF2B5EF4-FFF2-40B4-BE49-F238E27FC236}">
+                <a16:creationId xmlns:a16="http://schemas.microsoft.com/office/drawing/2014/main" id="{96A69B67-006F-4FB0-914C-3755B8758AF4}"/>
+              </a:ext>
+            </a:extLst>
+          </p:cNvPr>
+          <p:cNvSpPr>
+            <a:spLocks noGrp="1"/>
+          </p:cNvSpPr>
+          <p:nvPr>
+            <p:ph type="title"/>
           </p:nvPr>
         </p:nvSpPr>
         <p:spPr>
           <a:xfrm>
-            <a:off x="838200" y="357809"/>
-            <a:ext cx="10515600" cy="5819154"/>
+            <a:off x="796730" y="311626"/>
+            <a:ext cx="10515600" cy="699283"/>
           </a:xfrm>
         </p:spPr>
         <p:txBody>
@@ -6109,64 +6850,49 @@
           <a:p>
             <a:r>
               <a:rPr lang="en-CA" dirty="0"/>
-              <a:t>Cancellation by Airlines only</a:t>
-            </a:r>
-          </a:p>
+              <a:t>Airlines performance analysis</a:t>
+            </a:r>
+          </a:p>
+        </p:txBody>
+      </p:sp>
+      <p:sp>
+        <p:nvSpPr>
+          <p:cNvPr id="10" name="Rectangle 9">
+            <a:extLst>
+              <a:ext uri="{FF2B5EF4-FFF2-40B4-BE49-F238E27FC236}">
+                <a16:creationId xmlns:a16="http://schemas.microsoft.com/office/drawing/2014/main" id="{E916CD28-54E8-484A-9C2E-026E0F50190A}"/>
+              </a:ext>
+            </a:extLst>
+          </p:cNvPr>
+          <p:cNvSpPr/>
+          <p:nvPr/>
+        </p:nvSpPr>
+        <p:spPr>
+          <a:xfrm>
+            <a:off x="838200" y="1010909"/>
+            <a:ext cx="9647943" cy="369332"/>
+          </a:xfrm>
+          <a:prstGeom prst="rect">
+            <a:avLst/>
+          </a:prstGeom>
+        </p:spPr>
+        <p:txBody>
+          <a:bodyPr wrap="square">
+            <a:spAutoFit/>
+          </a:bodyPr>
+          <a:lstStyle/>
           <a:p>
             <a:r>
               <a:rPr lang="en-CA" dirty="0"/>
-              <a:t>Graph showing cancellation by reason airline only</a:t>
-            </a:r>
-          </a:p>
-          <a:p>
-            <a:r>
-              <a:rPr lang="en-CA" dirty="0"/>
-              <a:t>Percentage of cancellation caused for each airline – (</a:t>
-            </a:r>
-            <a:r>
-              <a:rPr lang="en-CA" dirty="0" err="1"/>
-              <a:t>diana’s</a:t>
-            </a:r>
-            <a:r>
-              <a:rPr lang="en-CA" dirty="0"/>
-              <a:t> python)</a:t>
-            </a:r>
-          </a:p>
-        </p:txBody>
-      </p:sp>
-      <p:sp>
-        <p:nvSpPr>
-          <p:cNvPr id="4" name="Footer Placeholder 3">
-            <a:extLst>
-              <a:ext uri="{FF2B5EF4-FFF2-40B4-BE49-F238E27FC236}">
-                <a16:creationId xmlns:a16="http://schemas.microsoft.com/office/drawing/2014/main" id="{9D297521-078A-4805-ADEF-F3763BFB88FC}"/>
-              </a:ext>
-            </a:extLst>
-          </p:cNvPr>
-          <p:cNvSpPr>
-            <a:spLocks noGrp="1"/>
-          </p:cNvSpPr>
-          <p:nvPr>
-            <p:ph type="ftr" sz="quarter" idx="11"/>
-          </p:nvPr>
-        </p:nvSpPr>
-        <p:spPr/>
-        <p:txBody>
-          <a:bodyPr/>
-          <a:lstStyle/>
-          <a:p>
-            <a:r>
-              <a:rPr lang="en-US"/>
-              <a:t>CSDA1000SUMA18 - Airport Gate Assignment Optimization</a:t>
-            </a:r>
-            <a:endParaRPr lang="en-CA"/>
+              <a:t>Percentage of delay per Airline</a:t>
+            </a:r>
           </a:p>
         </p:txBody>
       </p:sp>
     </p:spTree>
     <p:extLst>
       <p:ext uri="{BB962C8B-B14F-4D97-AF65-F5344CB8AC3E}">
-        <p14:creationId xmlns:p14="http://schemas.microsoft.com/office/powerpoint/2010/main" val="2404455960"/>
+        <p14:creationId xmlns:p14="http://schemas.microsoft.com/office/powerpoint/2010/main" val="502788393"/>
       </p:ext>
     </p:extLst>
   </p:cSld>

</xml_diff>